<commit_message>
[OAUTH2] basics of oAuth 2.0
</commit_message>
<xml_diff>
--- a/SECURITY/img/img src.pptx
+++ b/SECURITY/img/img src.pptx
@@ -10,6 +10,7 @@
     <p:sldId id="258" r:id="rId4"/>
     <p:sldId id="259" r:id="rId5"/>
     <p:sldId id="260" r:id="rId6"/>
+    <p:sldId id="261" r:id="rId7"/>
   </p:sldIdLst>
   <p:sldSz cx="12192000" cy="6858000"/>
   <p:notesSz cx="6858000" cy="9144000"/>
@@ -108,6 +109,11 @@
       </a:defRPr>
     </a:lvl9pPr>
   </p:defaultTextStyle>
+  <p:extLst>
+    <p:ext uri="{EFAFB233-063F-42B5-8137-9DF3F51BA10A}">
+      <p15:sldGuideLst xmlns:p15="http://schemas.microsoft.com/office/powerpoint/2012/main"/>
+    </p:ext>
+  </p:extLst>
 </p:presentation>
 </file>
 
@@ -242,7 +248,7 @@
           <a:p>
             <a:fld id="{75F7E093-77E9-4BFF-A825-C82FD28346C4}" type="datetimeFigureOut">
               <a:rPr lang="ko-KR" altLang="en-US" smtClean="0"/>
-              <a:t>2021-04-26</a:t>
+              <a:t>2021-04-27</a:t>
             </a:fld>
             <a:endParaRPr lang="ko-KR" altLang="en-US"/>
           </a:p>
@@ -412,7 +418,7 @@
           <a:p>
             <a:fld id="{75F7E093-77E9-4BFF-A825-C82FD28346C4}" type="datetimeFigureOut">
               <a:rPr lang="ko-KR" altLang="en-US" smtClean="0"/>
-              <a:t>2021-04-26</a:t>
+              <a:t>2021-04-27</a:t>
             </a:fld>
             <a:endParaRPr lang="ko-KR" altLang="en-US"/>
           </a:p>
@@ -592,7 +598,7 @@
           <a:p>
             <a:fld id="{75F7E093-77E9-4BFF-A825-C82FD28346C4}" type="datetimeFigureOut">
               <a:rPr lang="ko-KR" altLang="en-US" smtClean="0"/>
-              <a:t>2021-04-26</a:t>
+              <a:t>2021-04-27</a:t>
             </a:fld>
             <a:endParaRPr lang="ko-KR" altLang="en-US"/>
           </a:p>
@@ -762,7 +768,7 @@
           <a:p>
             <a:fld id="{75F7E093-77E9-4BFF-A825-C82FD28346C4}" type="datetimeFigureOut">
               <a:rPr lang="ko-KR" altLang="en-US" smtClean="0"/>
-              <a:t>2021-04-26</a:t>
+              <a:t>2021-04-27</a:t>
             </a:fld>
             <a:endParaRPr lang="ko-KR" altLang="en-US"/>
           </a:p>
@@ -1008,7 +1014,7 @@
           <a:p>
             <a:fld id="{75F7E093-77E9-4BFF-A825-C82FD28346C4}" type="datetimeFigureOut">
               <a:rPr lang="ko-KR" altLang="en-US" smtClean="0"/>
-              <a:t>2021-04-26</a:t>
+              <a:t>2021-04-27</a:t>
             </a:fld>
             <a:endParaRPr lang="ko-KR" altLang="en-US"/>
           </a:p>
@@ -1240,7 +1246,7 @@
           <a:p>
             <a:fld id="{75F7E093-77E9-4BFF-A825-C82FD28346C4}" type="datetimeFigureOut">
               <a:rPr lang="ko-KR" altLang="en-US" smtClean="0"/>
-              <a:t>2021-04-26</a:t>
+              <a:t>2021-04-27</a:t>
             </a:fld>
             <a:endParaRPr lang="ko-KR" altLang="en-US"/>
           </a:p>
@@ -1607,7 +1613,7 @@
           <a:p>
             <a:fld id="{75F7E093-77E9-4BFF-A825-C82FD28346C4}" type="datetimeFigureOut">
               <a:rPr lang="ko-KR" altLang="en-US" smtClean="0"/>
-              <a:t>2021-04-26</a:t>
+              <a:t>2021-04-27</a:t>
             </a:fld>
             <a:endParaRPr lang="ko-KR" altLang="en-US"/>
           </a:p>
@@ -1725,7 +1731,7 @@
           <a:p>
             <a:fld id="{75F7E093-77E9-4BFF-A825-C82FD28346C4}" type="datetimeFigureOut">
               <a:rPr lang="ko-KR" altLang="en-US" smtClean="0"/>
-              <a:t>2021-04-26</a:t>
+              <a:t>2021-04-27</a:t>
             </a:fld>
             <a:endParaRPr lang="ko-KR" altLang="en-US"/>
           </a:p>
@@ -1820,7 +1826,7 @@
           <a:p>
             <a:fld id="{75F7E093-77E9-4BFF-A825-C82FD28346C4}" type="datetimeFigureOut">
               <a:rPr lang="ko-KR" altLang="en-US" smtClean="0"/>
-              <a:t>2021-04-26</a:t>
+              <a:t>2021-04-27</a:t>
             </a:fld>
             <a:endParaRPr lang="ko-KR" altLang="en-US"/>
           </a:p>
@@ -2097,7 +2103,7 @@
           <a:p>
             <a:fld id="{75F7E093-77E9-4BFF-A825-C82FD28346C4}" type="datetimeFigureOut">
               <a:rPr lang="ko-KR" altLang="en-US" smtClean="0"/>
-              <a:t>2021-04-26</a:t>
+              <a:t>2021-04-27</a:t>
             </a:fld>
             <a:endParaRPr lang="ko-KR" altLang="en-US"/>
           </a:p>
@@ -2350,7 +2356,7 @@
           <a:p>
             <a:fld id="{75F7E093-77E9-4BFF-A825-C82FD28346C4}" type="datetimeFigureOut">
               <a:rPr lang="ko-KR" altLang="en-US" smtClean="0"/>
-              <a:t>2021-04-26</a:t>
+              <a:t>2021-04-27</a:t>
             </a:fld>
             <a:endParaRPr lang="ko-KR" altLang="en-US"/>
           </a:p>
@@ -2563,7 +2569,7 @@
           <a:p>
             <a:fld id="{75F7E093-77E9-4BFF-A825-C82FD28346C4}" type="datetimeFigureOut">
               <a:rPr lang="ko-KR" altLang="en-US" smtClean="0"/>
-              <a:t>2021-04-26</a:t>
+              <a:t>2021-04-27</a:t>
             </a:fld>
             <a:endParaRPr lang="ko-KR" altLang="en-US"/>
           </a:p>
@@ -5019,42 +5025,603 @@
       </p:grpSpPr>
       <p:grpSp>
         <p:nvGrpSpPr>
-          <p:cNvPr id="49" name="그룹 48"/>
+          <p:cNvPr id="16" name="그룹 15"/>
           <p:cNvGrpSpPr/>
           <p:nvPr/>
         </p:nvGrpSpPr>
         <p:grpSpPr>
           <a:xfrm>
-            <a:off x="1011044" y="239752"/>
+            <a:off x="1011044" y="214814"/>
             <a:ext cx="11066656" cy="6378497"/>
-            <a:chOff x="1011044" y="239752"/>
+            <a:chOff x="1011044" y="214814"/>
             <a:chExt cx="11066656" cy="6378497"/>
           </a:xfrm>
         </p:grpSpPr>
+        <p:sp>
+          <p:nvSpPr>
+            <p:cNvPr id="15" name="직사각형 14"/>
+            <p:cNvSpPr/>
+            <p:nvPr/>
+          </p:nvSpPr>
+          <p:spPr>
+            <a:xfrm>
+              <a:off x="1011044" y="214814"/>
+              <a:ext cx="10169912" cy="6378497"/>
+            </a:xfrm>
+            <a:prstGeom prst="rect">
+              <a:avLst/>
+            </a:prstGeom>
+            <a:solidFill>
+              <a:schemeClr val="bg1"/>
+            </a:solidFill>
+            <a:ln>
+              <a:noFill/>
+            </a:ln>
+          </p:spPr>
+          <p:style>
+            <a:lnRef idx="2">
+              <a:schemeClr val="accent1">
+                <a:shade val="50000"/>
+              </a:schemeClr>
+            </a:lnRef>
+            <a:fillRef idx="1">
+              <a:schemeClr val="accent1"/>
+            </a:fillRef>
+            <a:effectRef idx="0">
+              <a:schemeClr val="accent1"/>
+            </a:effectRef>
+            <a:fontRef idx="minor">
+              <a:schemeClr val="lt1"/>
+            </a:fontRef>
+          </p:style>
+          <p:txBody>
+            <a:bodyPr rtlCol="0" anchor="ctr"/>
+            <a:lstStyle/>
+            <a:p>
+              <a:pPr algn="ctr"/>
+              <a:endParaRPr lang="ko-KR" altLang="en-US"/>
+            </a:p>
+          </p:txBody>
+        </p:sp>
+        <p:pic>
+          <p:nvPicPr>
+            <p:cNvPr id="6" name="그림 5"/>
+            <p:cNvPicPr>
+              <a:picLocks noChangeAspect="1"/>
+            </p:cNvPicPr>
+            <p:nvPr/>
+          </p:nvPicPr>
+          <p:blipFill>
+            <a:blip r:embed="rId2" cstate="print">
+              <a:extLst>
+                <a:ext uri="{28A0092B-C50C-407E-A947-70E740481C1C}">
+                  <a14:useLocalDpi xmlns:a14="http://schemas.microsoft.com/office/drawing/2010/main" val="0"/>
+                </a:ext>
+              </a:extLst>
+            </a:blip>
+            <a:stretch>
+              <a:fillRect/>
+            </a:stretch>
+          </p:blipFill>
+          <p:spPr>
+            <a:xfrm>
+              <a:off x="7091547" y="462594"/>
+              <a:ext cx="1532157" cy="1532157"/>
+            </a:xfrm>
+            <a:prstGeom prst="rect">
+              <a:avLst/>
+            </a:prstGeom>
+          </p:spPr>
+        </p:pic>
+        <p:pic>
+          <p:nvPicPr>
+            <p:cNvPr id="7" name="그림 6"/>
+            <p:cNvPicPr>
+              <a:picLocks noChangeAspect="1"/>
+            </p:cNvPicPr>
+            <p:nvPr/>
+          </p:nvPicPr>
+          <p:blipFill>
+            <a:blip r:embed="rId3" cstate="print">
+              <a:extLst>
+                <a:ext uri="{28A0092B-C50C-407E-A947-70E740481C1C}">
+                  <a14:useLocalDpi xmlns:a14="http://schemas.microsoft.com/office/drawing/2010/main" val="0"/>
+                </a:ext>
+              </a:extLst>
+            </a:blip>
+            <a:stretch>
+              <a:fillRect/>
+            </a:stretch>
+          </p:blipFill>
+          <p:spPr>
+            <a:xfrm>
+              <a:off x="2184391" y="2353158"/>
+              <a:ext cx="1532157" cy="1532157"/>
+            </a:xfrm>
+            <a:prstGeom prst="rect">
+              <a:avLst/>
+            </a:prstGeom>
+          </p:spPr>
+        </p:pic>
+        <p:pic>
+          <p:nvPicPr>
+            <p:cNvPr id="9" name="그림 8"/>
+            <p:cNvPicPr>
+              <a:picLocks noChangeAspect="1"/>
+            </p:cNvPicPr>
+            <p:nvPr/>
+          </p:nvPicPr>
+          <p:blipFill>
+            <a:blip r:embed="rId4" cstate="print">
+              <a:extLst>
+                <a:ext uri="{28A0092B-C50C-407E-A947-70E740481C1C}">
+                  <a14:useLocalDpi xmlns:a14="http://schemas.microsoft.com/office/drawing/2010/main" val="0"/>
+                </a:ext>
+              </a:extLst>
+            </a:blip>
+            <a:stretch>
+              <a:fillRect/>
+            </a:stretch>
+          </p:blipFill>
+          <p:spPr>
+            <a:xfrm>
+              <a:off x="7226807" y="4473468"/>
+              <a:ext cx="1261642" cy="1261642"/>
+            </a:xfrm>
+            <a:prstGeom prst="rect">
+              <a:avLst/>
+            </a:prstGeom>
+          </p:spPr>
+        </p:pic>
+        <p:sp>
+          <p:nvSpPr>
+            <p:cNvPr id="12" name="TextBox 11"/>
+            <p:cNvSpPr txBox="1"/>
+            <p:nvPr/>
+          </p:nvSpPr>
+          <p:spPr>
+            <a:xfrm>
+              <a:off x="1597919" y="4011803"/>
+              <a:ext cx="2705100" cy="830997"/>
+            </a:xfrm>
+            <a:prstGeom prst="rect">
+              <a:avLst/>
+            </a:prstGeom>
+            <a:noFill/>
+          </p:spPr>
+          <p:txBody>
+            <a:bodyPr wrap="square" rtlCol="0">
+              <a:spAutoFit/>
+            </a:bodyPr>
+            <a:lstStyle/>
+            <a:p>
+              <a:pPr algn="ctr"/>
+              <a:r>
+                <a:rPr lang="en-US" altLang="ko-KR" sz="2400" dirty="0" smtClean="0">
+                  <a:latin typeface="나눔스퀘어 Bold" panose="020B0600000101010101" pitchFamily="50" charset="-127"/>
+                  <a:ea typeface="나눔스퀘어 Bold" panose="020B0600000101010101" pitchFamily="50" charset="-127"/>
+                </a:rPr>
+                <a:t>Resource Owner</a:t>
+              </a:r>
+              <a:endParaRPr lang="en-US" altLang="ko-KR" sz="2400" dirty="0" smtClean="0">
+                <a:solidFill>
+                  <a:schemeClr val="bg2">
+                    <a:lumMod val="90000"/>
+                  </a:schemeClr>
+                </a:solidFill>
+                <a:latin typeface="나눔스퀘어 Bold" panose="020B0600000101010101" pitchFamily="50" charset="-127"/>
+                <a:ea typeface="나눔스퀘어 Bold" panose="020B0600000101010101" pitchFamily="50" charset="-127"/>
+              </a:endParaRPr>
+            </a:p>
+            <a:p>
+              <a:pPr algn="ctr"/>
+              <a:endParaRPr lang="en-US" altLang="ko-KR" sz="2400" dirty="0" smtClean="0">
+                <a:solidFill>
+                  <a:schemeClr val="bg2">
+                    <a:lumMod val="90000"/>
+                  </a:schemeClr>
+                </a:solidFill>
+                <a:latin typeface="나눔스퀘어 Bold" panose="020B0600000101010101" pitchFamily="50" charset="-127"/>
+                <a:ea typeface="나눔스퀘어 Bold" panose="020B0600000101010101" pitchFamily="50" charset="-127"/>
+              </a:endParaRPr>
+            </a:p>
+          </p:txBody>
+        </p:sp>
+        <p:sp>
+          <p:nvSpPr>
+            <p:cNvPr id="13" name="TextBox 12"/>
+            <p:cNvSpPr txBox="1"/>
+            <p:nvPr/>
+          </p:nvSpPr>
+          <p:spPr>
+            <a:xfrm>
+              <a:off x="6726576" y="1886658"/>
+              <a:ext cx="2262103" cy="461665"/>
+            </a:xfrm>
+            <a:prstGeom prst="rect">
+              <a:avLst/>
+            </a:prstGeom>
+            <a:noFill/>
+          </p:spPr>
+          <p:txBody>
+            <a:bodyPr wrap="square" rtlCol="0">
+              <a:spAutoFit/>
+            </a:bodyPr>
+            <a:lstStyle/>
+            <a:p>
+              <a:pPr algn="ctr"/>
+              <a:r>
+                <a:rPr lang="en-US" altLang="ko-KR" sz="2400" dirty="0" smtClean="0">
+                  <a:latin typeface="나눔스퀘어 Bold" panose="020B0600000101010101" pitchFamily="50" charset="-127"/>
+                  <a:ea typeface="나눔스퀘어 Bold" panose="020B0600000101010101" pitchFamily="50" charset="-127"/>
+                </a:rPr>
+                <a:t>Client</a:t>
+              </a:r>
+            </a:p>
+          </p:txBody>
+        </p:sp>
+        <p:sp>
+          <p:nvSpPr>
+            <p:cNvPr id="14" name="TextBox 13"/>
+            <p:cNvSpPr txBox="1"/>
+            <p:nvPr/>
+          </p:nvSpPr>
+          <p:spPr>
+            <a:xfrm>
+              <a:off x="6503947" y="5906679"/>
+              <a:ext cx="2707356" cy="461665"/>
+            </a:xfrm>
+            <a:prstGeom prst="rect">
+              <a:avLst/>
+            </a:prstGeom>
+            <a:noFill/>
+          </p:spPr>
+          <p:txBody>
+            <a:bodyPr wrap="square" rtlCol="0">
+              <a:spAutoFit/>
+            </a:bodyPr>
+            <a:lstStyle/>
+            <a:p>
+              <a:pPr algn="ctr"/>
+              <a:r>
+                <a:rPr lang="en-US" altLang="ko-KR" sz="2400" dirty="0" smtClean="0">
+                  <a:latin typeface="나눔스퀘어 Bold" panose="020B0600000101010101" pitchFamily="50" charset="-127"/>
+                  <a:ea typeface="나눔스퀘어 Bold" panose="020B0600000101010101" pitchFamily="50" charset="-127"/>
+                </a:rPr>
+                <a:t>Resource Server</a:t>
+              </a:r>
+            </a:p>
+          </p:txBody>
+        </p:sp>
+        <p:sp>
+          <p:nvSpPr>
+            <p:cNvPr id="19" name="TextBox 18"/>
+            <p:cNvSpPr txBox="1"/>
+            <p:nvPr/>
+          </p:nvSpPr>
+          <p:spPr>
+            <a:xfrm>
+              <a:off x="8804638" y="748255"/>
+              <a:ext cx="2625362" cy="584775"/>
+            </a:xfrm>
+            <a:prstGeom prst="rect">
+              <a:avLst/>
+            </a:prstGeom>
+            <a:noFill/>
+          </p:spPr>
+          <p:txBody>
+            <a:bodyPr wrap="square" rtlCol="0">
+              <a:spAutoFit/>
+            </a:bodyPr>
+            <a:lstStyle/>
+            <a:p>
+              <a:r>
+                <a:rPr lang="en-US" altLang="ko-KR" sz="1600" dirty="0" smtClean="0">
+                  <a:latin typeface="나눔스퀘어 Bold" panose="020B0600000101010101" pitchFamily="50" charset="-127"/>
+                  <a:ea typeface="나눔스퀘어 Bold" panose="020B0600000101010101" pitchFamily="50" charset="-127"/>
+                </a:rPr>
+                <a:t>Client ID: 1234</a:t>
+              </a:r>
+            </a:p>
+            <a:p>
+              <a:r>
+                <a:rPr lang="en-US" altLang="ko-KR" sz="1600" dirty="0" smtClean="0">
+                  <a:latin typeface="나눔스퀘어 Bold" panose="020B0600000101010101" pitchFamily="50" charset="-127"/>
+                  <a:ea typeface="나눔스퀘어 Bold" panose="020B0600000101010101" pitchFamily="50" charset="-127"/>
+                </a:rPr>
+                <a:t>Client Secret: 0101</a:t>
+              </a:r>
+            </a:p>
+          </p:txBody>
+        </p:sp>
+        <p:sp>
+          <p:nvSpPr>
+            <p:cNvPr id="20" name="TextBox 19"/>
+            <p:cNvSpPr txBox="1"/>
+            <p:nvPr/>
+          </p:nvSpPr>
+          <p:spPr>
+            <a:xfrm>
+              <a:off x="8704806" y="4642624"/>
+              <a:ext cx="3372894" cy="1446550"/>
+            </a:xfrm>
+            <a:prstGeom prst="rect">
+              <a:avLst/>
+            </a:prstGeom>
+            <a:noFill/>
+          </p:spPr>
+          <p:txBody>
+            <a:bodyPr wrap="square" rtlCol="0">
+              <a:spAutoFit/>
+            </a:bodyPr>
+            <a:lstStyle/>
+            <a:p>
+              <a:r>
+                <a:rPr lang="en-US" altLang="ko-KR" sz="1600" dirty="0" smtClean="0">
+                  <a:latin typeface="나눔스퀘어 Bold" panose="020B0600000101010101" pitchFamily="50" charset="-127"/>
+                  <a:ea typeface="나눔스퀘어 Bold" panose="020B0600000101010101" pitchFamily="50" charset="-127"/>
+                </a:rPr>
+                <a:t>Client ID: 1234</a:t>
+              </a:r>
+            </a:p>
+            <a:p>
+              <a:r>
+                <a:rPr lang="en-US" altLang="ko-KR" sz="1600" dirty="0" smtClean="0">
+                  <a:latin typeface="나눔스퀘어 Bold" panose="020B0600000101010101" pitchFamily="50" charset="-127"/>
+                  <a:ea typeface="나눔스퀘어 Bold" panose="020B0600000101010101" pitchFamily="50" charset="-127"/>
+                </a:rPr>
+                <a:t>Client Secret: 0101</a:t>
+              </a:r>
+            </a:p>
+            <a:p>
+              <a:r>
+                <a:rPr lang="en-US" altLang="ko-KR" sz="1600" dirty="0" smtClean="0">
+                  <a:latin typeface="나눔스퀘어 Bold" panose="020B0600000101010101" pitchFamily="50" charset="-127"/>
+                  <a:ea typeface="나눔스퀘어 Bold" panose="020B0600000101010101" pitchFamily="50" charset="-127"/>
+                </a:rPr>
+                <a:t>Redirect URI: </a:t>
+              </a:r>
+              <a:r>
+                <a:rPr lang="en-US" altLang="ko-KR" sz="1400" dirty="0" smtClean="0">
+                  <a:latin typeface="나눔스퀘어 Bold" panose="020B0600000101010101" pitchFamily="50" charset="-127"/>
+                  <a:ea typeface="나눔스퀘어 Bold" panose="020B0600000101010101" pitchFamily="50" charset="-127"/>
+                </a:rPr>
+                <a:t>https://client/callback</a:t>
+              </a:r>
+            </a:p>
+            <a:p>
+              <a:pPr>
+                <a:lnSpc>
+                  <a:spcPct val="150000"/>
+                </a:lnSpc>
+              </a:pPr>
+              <a:r>
+                <a:rPr lang="en-US" altLang="ko-KR" sz="1600" dirty="0" smtClean="0">
+                  <a:latin typeface="나눔스퀘어 Bold" panose="020B0600000101010101" pitchFamily="50" charset="-127"/>
+                  <a:ea typeface="나눔스퀘어 Bold" panose="020B0600000101010101" pitchFamily="50" charset="-127"/>
+                </a:rPr>
+                <a:t>User ID: </a:t>
+              </a:r>
+              <a:r>
+                <a:rPr lang="en-US" altLang="ko-KR" sz="1600" dirty="0" err="1" smtClean="0">
+                  <a:latin typeface="나눔스퀘어 Bold" panose="020B0600000101010101" pitchFamily="50" charset="-127"/>
+                  <a:ea typeface="나눔스퀘어 Bold" panose="020B0600000101010101" pitchFamily="50" charset="-127"/>
+                </a:rPr>
+                <a:t>aaa</a:t>
+              </a:r>
+              <a:endParaRPr lang="en-US" altLang="ko-KR" sz="1600" dirty="0">
+                <a:latin typeface="나눔스퀘어 Bold" panose="020B0600000101010101" pitchFamily="50" charset="-127"/>
+                <a:ea typeface="나눔스퀘어 Bold" panose="020B0600000101010101" pitchFamily="50" charset="-127"/>
+              </a:endParaRPr>
+            </a:p>
+            <a:p>
+              <a:r>
+                <a:rPr lang="en-US" altLang="ko-KR" sz="1600" dirty="0" smtClean="0">
+                  <a:latin typeface="나눔스퀘어 Bold" panose="020B0600000101010101" pitchFamily="50" charset="-127"/>
+                  <a:ea typeface="나눔스퀘어 Bold" panose="020B0600000101010101" pitchFamily="50" charset="-127"/>
+                </a:rPr>
+                <a:t>- scope: B, C </a:t>
+              </a:r>
+            </a:p>
+          </p:txBody>
+        </p:sp>
+        <p:sp>
+          <p:nvSpPr>
+            <p:cNvPr id="3" name="TextBox 2"/>
+            <p:cNvSpPr txBox="1"/>
+            <p:nvPr/>
+          </p:nvSpPr>
+          <p:spPr>
+            <a:xfrm>
+              <a:off x="3100498" y="474968"/>
+              <a:ext cx="2134314" cy="1169551"/>
+            </a:xfrm>
+            <a:prstGeom prst="rect">
+              <a:avLst/>
+            </a:prstGeom>
+            <a:noFill/>
+            <a:ln>
+              <a:solidFill>
+                <a:schemeClr val="bg1">
+                  <a:lumMod val="75000"/>
+                </a:schemeClr>
+              </a:solidFill>
+            </a:ln>
+          </p:spPr>
+          <p:txBody>
+            <a:bodyPr wrap="square" rtlCol="0">
+              <a:spAutoFit/>
+            </a:bodyPr>
+            <a:lstStyle/>
+            <a:p>
+              <a:r>
+                <a:rPr lang="en-US" altLang="ko-KR" sz="1400" dirty="0" err="1" smtClean="0">
+                  <a:latin typeface="나눔스퀘어 Bold" panose="020B0600000101010101" pitchFamily="50" charset="-127"/>
+                  <a:ea typeface="나눔스퀘어 Bold" panose="020B0600000101010101" pitchFamily="50" charset="-127"/>
+                </a:rPr>
+                <a:t>resource.server</a:t>
+              </a:r>
+              <a:r>
+                <a:rPr lang="en-US" altLang="ko-KR" sz="1400" dirty="0" smtClean="0">
+                  <a:latin typeface="나눔스퀘어 Bold" panose="020B0600000101010101" pitchFamily="50" charset="-127"/>
+                  <a:ea typeface="나눔스퀘어 Bold" panose="020B0600000101010101" pitchFamily="50" charset="-127"/>
+                </a:rPr>
+                <a:t>/</a:t>
+              </a:r>
+            </a:p>
+            <a:p>
+              <a:r>
+                <a:rPr lang="en-US" altLang="ko-KR" sz="1400" dirty="0" smtClean="0">
+                  <a:latin typeface="나눔스퀘어 Bold" panose="020B0600000101010101" pitchFamily="50" charset="-127"/>
+                  <a:ea typeface="나눔스퀘어 Bold" panose="020B0600000101010101" pitchFamily="50" charset="-127"/>
+                </a:rPr>
+                <a:t>?</a:t>
+              </a:r>
+              <a:r>
+                <a:rPr lang="en-US" altLang="ko-KR" sz="1400" dirty="0" err="1" smtClean="0">
+                  <a:latin typeface="나눔스퀘어 Bold" panose="020B0600000101010101" pitchFamily="50" charset="-127"/>
+                  <a:ea typeface="나눔스퀘어 Bold" panose="020B0600000101010101" pitchFamily="50" charset="-127"/>
+                </a:rPr>
+                <a:t>client_id</a:t>
+              </a:r>
+              <a:r>
+                <a:rPr lang="en-US" altLang="ko-KR" sz="1400" dirty="0" smtClean="0">
+                  <a:latin typeface="나눔스퀘어 Bold" panose="020B0600000101010101" pitchFamily="50" charset="-127"/>
+                  <a:ea typeface="나눔스퀘어 Bold" panose="020B0600000101010101" pitchFamily="50" charset="-127"/>
+                </a:rPr>
+                <a:t>=1234</a:t>
+              </a:r>
+              <a:br>
+                <a:rPr lang="en-US" altLang="ko-KR" sz="1400" dirty="0" smtClean="0">
+                  <a:latin typeface="나눔스퀘어 Bold" panose="020B0600000101010101" pitchFamily="50" charset="-127"/>
+                  <a:ea typeface="나눔스퀘어 Bold" panose="020B0600000101010101" pitchFamily="50" charset="-127"/>
+                </a:rPr>
+              </a:br>
+              <a:r>
+                <a:rPr lang="en-US" altLang="ko-KR" sz="1400" dirty="0" smtClean="0">
+                  <a:latin typeface="나눔스퀘어 Bold" panose="020B0600000101010101" pitchFamily="50" charset="-127"/>
+                  <a:ea typeface="나눔스퀘어 Bold" panose="020B0600000101010101" pitchFamily="50" charset="-127"/>
+                </a:rPr>
+                <a:t>&amp;scope=B,C</a:t>
+              </a:r>
+            </a:p>
+            <a:p>
+              <a:r>
+                <a:rPr lang="en-US" altLang="ko-KR" sz="1400" dirty="0" smtClean="0">
+                  <a:latin typeface="나눔스퀘어 Bold" panose="020B0600000101010101" pitchFamily="50" charset="-127"/>
+                  <a:ea typeface="나눔스퀘어 Bold" panose="020B0600000101010101" pitchFamily="50" charset="-127"/>
+                </a:rPr>
+                <a:t>&amp;</a:t>
+              </a:r>
+              <a:r>
+                <a:rPr lang="en-US" altLang="ko-KR" sz="1400" dirty="0" err="1" smtClean="0">
+                  <a:latin typeface="나눔스퀘어 Bold" panose="020B0600000101010101" pitchFamily="50" charset="-127"/>
+                  <a:ea typeface="나눔스퀘어 Bold" panose="020B0600000101010101" pitchFamily="50" charset="-127"/>
+                </a:rPr>
+                <a:t>redirect_uri</a:t>
+              </a:r>
+              <a:r>
+                <a:rPr lang="en-US" altLang="ko-KR" sz="1400" dirty="0" smtClean="0">
+                  <a:latin typeface="나눔스퀘어 Bold" panose="020B0600000101010101" pitchFamily="50" charset="-127"/>
+                  <a:ea typeface="나눔스퀘어 Bold" panose="020B0600000101010101" pitchFamily="50" charset="-127"/>
+                </a:rPr>
+                <a:t>= https://client/callback </a:t>
+              </a:r>
+              <a:endParaRPr lang="ko-KR" altLang="en-US" sz="1400" dirty="0">
+                <a:latin typeface="나눔스퀘어 Bold" panose="020B0600000101010101" pitchFamily="50" charset="-127"/>
+                <a:ea typeface="나눔스퀘어 Bold" panose="020B0600000101010101" pitchFamily="50" charset="-127"/>
+              </a:endParaRPr>
+            </a:p>
+          </p:txBody>
+        </p:sp>
+        <p:cxnSp>
+          <p:nvCxnSpPr>
+            <p:cNvPr id="21" name="직선 화살표 연결선 20"/>
+            <p:cNvCxnSpPr/>
+            <p:nvPr/>
+          </p:nvCxnSpPr>
+          <p:spPr>
+            <a:xfrm>
+              <a:off x="3932350" y="3376309"/>
+              <a:ext cx="3180200" cy="1594778"/>
+            </a:xfrm>
+            <a:prstGeom prst="straightConnector1">
+              <a:avLst/>
+            </a:prstGeom>
+            <a:ln w="57150">
+              <a:tailEnd type="triangle"/>
+            </a:ln>
+          </p:spPr>
+          <p:style>
+            <a:lnRef idx="1">
+              <a:schemeClr val="dk1"/>
+            </a:lnRef>
+            <a:fillRef idx="0">
+              <a:schemeClr val="dk1"/>
+            </a:fillRef>
+            <a:effectRef idx="0">
+              <a:schemeClr val="dk1"/>
+            </a:effectRef>
+            <a:fontRef idx="minor">
+              <a:schemeClr val="tx1"/>
+            </a:fontRef>
+          </p:style>
+        </p:cxnSp>
         <p:grpSp>
           <p:nvGrpSpPr>
-            <p:cNvPr id="46" name="그룹 45"/>
+            <p:cNvPr id="11" name="그룹 10"/>
             <p:cNvGrpSpPr/>
             <p:nvPr/>
           </p:nvGrpSpPr>
           <p:grpSpPr>
             <a:xfrm>
-              <a:off x="1011044" y="239752"/>
-              <a:ext cx="11066656" cy="6378497"/>
-              <a:chOff x="1011044" y="239752"/>
-              <a:chExt cx="11066656" cy="6378497"/>
+              <a:off x="4517602" y="2956027"/>
+              <a:ext cx="1695644" cy="2966355"/>
+              <a:chOff x="5634257" y="3345593"/>
+              <a:chExt cx="1137622" cy="1990153"/>
             </a:xfrm>
           </p:grpSpPr>
+          <p:pic>
+            <p:nvPicPr>
+              <p:cNvPr id="4" name="그림 3"/>
+              <p:cNvPicPr>
+                <a:picLocks noChangeAspect="1"/>
+              </p:cNvPicPr>
+              <p:nvPr/>
+            </p:nvPicPr>
+            <p:blipFill>
+              <a:blip r:embed="rId5"/>
+              <a:stretch>
+                <a:fillRect/>
+              </a:stretch>
+            </p:blipFill>
+            <p:spPr>
+              <a:xfrm>
+                <a:off x="5634257" y="3345593"/>
+                <a:ext cx="1137622" cy="1990153"/>
+              </a:xfrm>
+              <a:prstGeom prst="rect">
+                <a:avLst/>
+              </a:prstGeom>
+              <a:ln>
+                <a:solidFill>
+                  <a:schemeClr val="bg1">
+                    <a:lumMod val="75000"/>
+                  </a:schemeClr>
+                </a:solidFill>
+              </a:ln>
+            </p:spPr>
+          </p:pic>
           <p:sp>
             <p:nvSpPr>
-              <p:cNvPr id="15" name="직사각형 14"/>
+              <p:cNvPr id="23" name="직사각형 22"/>
               <p:cNvSpPr/>
               <p:nvPr/>
             </p:nvSpPr>
             <p:spPr>
               <a:xfrm>
-                <a:off x="1011044" y="239752"/>
-                <a:ext cx="10169912" cy="6378497"/>
+                <a:off x="5719142" y="3391095"/>
+                <a:ext cx="247650" cy="74889"/>
               </a:xfrm>
               <a:prstGeom prst="rect">
                 <a:avLst/>
@@ -5091,106 +5658,58 @@
               </a:p>
             </p:txBody>
           </p:sp>
-          <p:pic>
-            <p:nvPicPr>
-              <p:cNvPr id="6" name="그림 5"/>
-              <p:cNvPicPr>
-                <a:picLocks noChangeAspect="1"/>
-              </p:cNvPicPr>
-              <p:nvPr/>
-            </p:nvPicPr>
-            <p:blipFill>
-              <a:blip r:embed="rId2" cstate="print">
-                <a:extLst>
-                  <a:ext uri="{28A0092B-C50C-407E-A947-70E740481C1C}">
-                    <a14:useLocalDpi xmlns:a14="http://schemas.microsoft.com/office/drawing/2010/main" val="0"/>
-                  </a:ext>
-                </a:extLst>
-              </a:blip>
-              <a:stretch>
-                <a:fillRect/>
-              </a:stretch>
-            </p:blipFill>
-            <p:spPr>
-              <a:xfrm>
-                <a:off x="7091547" y="487532"/>
-                <a:ext cx="1532157" cy="1532157"/>
-              </a:xfrm>
-              <a:prstGeom prst="rect">
-                <a:avLst/>
-              </a:prstGeom>
-            </p:spPr>
-          </p:pic>
-          <p:pic>
-            <p:nvPicPr>
-              <p:cNvPr id="7" name="그림 6"/>
-              <p:cNvPicPr>
-                <a:picLocks noChangeAspect="1"/>
-              </p:cNvPicPr>
-              <p:nvPr/>
-            </p:nvPicPr>
-            <p:blipFill>
-              <a:blip r:embed="rId3" cstate="print">
-                <a:extLst>
-                  <a:ext uri="{28A0092B-C50C-407E-A947-70E740481C1C}">
-                    <a14:useLocalDpi xmlns:a14="http://schemas.microsoft.com/office/drawing/2010/main" val="0"/>
-                  </a:ext>
-                </a:extLst>
-              </a:blip>
-              <a:stretch>
-                <a:fillRect/>
-              </a:stretch>
-            </p:blipFill>
-            <p:spPr>
-              <a:xfrm>
-                <a:off x="2184391" y="2378096"/>
-                <a:ext cx="1532157" cy="1532157"/>
-              </a:xfrm>
-              <a:prstGeom prst="rect">
-                <a:avLst/>
-              </a:prstGeom>
-            </p:spPr>
-          </p:pic>
-          <p:pic>
-            <p:nvPicPr>
-              <p:cNvPr id="9" name="그림 8"/>
-              <p:cNvPicPr>
-                <a:picLocks noChangeAspect="1"/>
-              </p:cNvPicPr>
-              <p:nvPr/>
-            </p:nvPicPr>
-            <p:blipFill>
-              <a:blip r:embed="rId4" cstate="print">
-                <a:extLst>
-                  <a:ext uri="{28A0092B-C50C-407E-A947-70E740481C1C}">
-                    <a14:useLocalDpi xmlns:a14="http://schemas.microsoft.com/office/drawing/2010/main" val="0"/>
-                  </a:ext>
-                </a:extLst>
-              </a:blip>
-              <a:stretch>
-                <a:fillRect/>
-              </a:stretch>
-            </p:blipFill>
-            <p:spPr>
-              <a:xfrm>
-                <a:off x="7226807" y="4498406"/>
-                <a:ext cx="1261642" cy="1261642"/>
-              </a:xfrm>
-              <a:prstGeom prst="rect">
-                <a:avLst/>
-              </a:prstGeom>
-            </p:spPr>
-          </p:pic>
           <p:sp>
             <p:nvSpPr>
-              <p:cNvPr id="12" name="TextBox 11"/>
+              <p:cNvPr id="22" name="TextBox 21"/>
               <p:cNvSpPr txBox="1"/>
               <p:nvPr/>
             </p:nvSpPr>
             <p:spPr>
               <a:xfrm>
-                <a:off x="1597919" y="4036741"/>
-                <a:ext cx="2705100" cy="830997"/>
+                <a:off x="5708186" y="3352937"/>
+                <a:ext cx="387304" cy="144543"/>
+              </a:xfrm>
+              <a:prstGeom prst="rect">
+                <a:avLst/>
+              </a:prstGeom>
+              <a:noFill/>
+            </p:spPr>
+            <p:txBody>
+              <a:bodyPr wrap="square" rtlCol="0">
+                <a:spAutoFit/>
+              </a:bodyPr>
+              <a:lstStyle/>
+              <a:p>
+                <a:r>
+                  <a:rPr lang="en-US" altLang="ko-KR" sz="800" dirty="0" smtClean="0">
+                    <a:solidFill>
+                      <a:srgbClr val="4285F4"/>
+                    </a:solidFill>
+                    <a:latin typeface="나눔스퀘어 ExtraBold" panose="020B0600000101010101" pitchFamily="50" charset="-127"/>
+                    <a:ea typeface="나눔스퀘어 ExtraBold" panose="020B0600000101010101" pitchFamily="50" charset="-127"/>
+                  </a:rPr>
+                  <a:t>Client</a:t>
+                </a:r>
+                <a:endParaRPr lang="ko-KR" altLang="en-US" sz="800" dirty="0">
+                  <a:solidFill>
+                    <a:srgbClr val="4285F4"/>
+                  </a:solidFill>
+                  <a:latin typeface="나눔스퀘어 ExtraBold" panose="020B0600000101010101" pitchFamily="50" charset="-127"/>
+                  <a:ea typeface="나눔스퀘어 ExtraBold" panose="020B0600000101010101" pitchFamily="50" charset="-127"/>
+                </a:endParaRPr>
+              </a:p>
+            </p:txBody>
+          </p:sp>
+          <p:sp>
+            <p:nvSpPr>
+              <p:cNvPr id="24" name="TextBox 23"/>
+              <p:cNvSpPr txBox="1"/>
+              <p:nvPr/>
+            </p:nvSpPr>
+            <p:spPr>
+              <a:xfrm>
+                <a:off x="5901839" y="3545098"/>
+                <a:ext cx="602457" cy="123894"/>
               </a:xfrm>
               <a:prstGeom prst="rect">
                 <a:avLst/>
@@ -5205,29 +5724,28 @@
               <a:p>
                 <a:pPr algn="ctr"/>
                 <a:r>
-                  <a:rPr lang="en-US" altLang="ko-KR" sz="2400" dirty="0" smtClean="0">
+                  <a:rPr lang="en-US" altLang="ko-KR" sz="600" dirty="0">
+                    <a:solidFill>
+                      <a:srgbClr val="4285F4"/>
+                    </a:solidFill>
                     <a:latin typeface="나눔스퀘어 Bold" panose="020B0600000101010101" pitchFamily="50" charset="-127"/>
                     <a:ea typeface="나눔스퀘어 Bold" panose="020B0600000101010101" pitchFamily="50" charset="-127"/>
                   </a:rPr>
-                  <a:t>Resource Owner</a:t>
+                  <a:t>u</a:t>
                 </a:r>
-                <a:endParaRPr lang="en-US" altLang="ko-KR" sz="2400" dirty="0" smtClean="0">
+                <a:r>
+                  <a:rPr lang="en-US" altLang="ko-KR" sz="600" dirty="0" smtClean="0">
+                    <a:solidFill>
+                      <a:srgbClr val="4285F4"/>
+                    </a:solidFill>
+                    <a:latin typeface="나눔스퀘어 Bold" panose="020B0600000101010101" pitchFamily="50" charset="-127"/>
+                    <a:ea typeface="나눔스퀘어 Bold" panose="020B0600000101010101" pitchFamily="50" charset="-127"/>
+                  </a:rPr>
+                  <a:t>ser.email.com</a:t>
+                </a:r>
+                <a:endParaRPr lang="ko-KR" altLang="en-US" sz="600" dirty="0">
                   <a:solidFill>
-                    <a:schemeClr val="bg2">
-                      <a:lumMod val="90000"/>
-                    </a:schemeClr>
-                  </a:solidFill>
-                  <a:latin typeface="나눔스퀘어 Bold" panose="020B0600000101010101" pitchFamily="50" charset="-127"/>
-                  <a:ea typeface="나눔스퀘어 Bold" panose="020B0600000101010101" pitchFamily="50" charset="-127"/>
-                </a:endParaRPr>
-              </a:p>
-              <a:p>
-                <a:pPr algn="ctr"/>
-                <a:endParaRPr lang="en-US" altLang="ko-KR" sz="2400" dirty="0" smtClean="0">
-                  <a:solidFill>
-                    <a:schemeClr val="bg2">
-                      <a:lumMod val="90000"/>
-                    </a:schemeClr>
+                    <a:srgbClr val="4285F4"/>
                   </a:solidFill>
                   <a:latin typeface="나눔스퀘어 Bold" panose="020B0600000101010101" pitchFamily="50" charset="-127"/>
                   <a:ea typeface="나눔스퀘어 Bold" panose="020B0600000101010101" pitchFamily="50" charset="-127"/>
@@ -5237,14 +5755,62 @@
           </p:sp>
           <p:sp>
             <p:nvSpPr>
-              <p:cNvPr id="13" name="TextBox 12"/>
+              <p:cNvPr id="25" name="직사각형 24"/>
+              <p:cNvSpPr/>
+              <p:nvPr/>
+            </p:nvSpPr>
+            <p:spPr>
+              <a:xfrm>
+                <a:off x="5955599" y="3716279"/>
+                <a:ext cx="167586" cy="45719"/>
+              </a:xfrm>
+              <a:prstGeom prst="rect">
+                <a:avLst/>
+              </a:prstGeom>
+              <a:solidFill>
+                <a:schemeClr val="bg1"/>
+              </a:solidFill>
+              <a:ln>
+                <a:solidFill>
+                  <a:schemeClr val="bg1"/>
+                </a:solidFill>
+              </a:ln>
+            </p:spPr>
+            <p:style>
+              <a:lnRef idx="2">
+                <a:schemeClr val="accent1">
+                  <a:shade val="50000"/>
+                </a:schemeClr>
+              </a:lnRef>
+              <a:fillRef idx="1">
+                <a:schemeClr val="accent1"/>
+              </a:fillRef>
+              <a:effectRef idx="0">
+                <a:schemeClr val="accent1"/>
+              </a:effectRef>
+              <a:fontRef idx="minor">
+                <a:schemeClr val="lt1"/>
+              </a:fontRef>
+            </p:style>
+            <p:txBody>
+              <a:bodyPr rtlCol="0" anchor="ctr"/>
+              <a:lstStyle/>
+              <a:p>
+                <a:pPr algn="ctr"/>
+                <a:endParaRPr lang="ko-KR" altLang="en-US"/>
+              </a:p>
+            </p:txBody>
+          </p:sp>
+          <p:sp>
+            <p:nvSpPr>
+              <p:cNvPr id="26" name="TextBox 25"/>
               <p:cNvSpPr txBox="1"/>
               <p:nvPr/>
             </p:nvSpPr>
             <p:spPr>
               <a:xfrm>
-                <a:off x="6726576" y="1911596"/>
-                <a:ext cx="2262103" cy="461665"/>
+                <a:off x="5864369" y="3680297"/>
+                <a:ext cx="350045" cy="113569"/>
               </a:xfrm>
               <a:prstGeom prst="rect">
                 <a:avLst/>
@@ -5259,25 +5825,83 @@
               <a:p>
                 <a:pPr algn="ctr"/>
                 <a:r>
-                  <a:rPr lang="en-US" altLang="ko-KR" sz="2400" dirty="0" smtClean="0">
+                  <a:rPr lang="en-US" altLang="ko-KR" sz="500" dirty="0" smtClean="0">
+                    <a:solidFill>
+                      <a:srgbClr val="4285F4"/>
+                    </a:solidFill>
                     <a:latin typeface="나눔스퀘어 Bold" panose="020B0600000101010101" pitchFamily="50" charset="-127"/>
                     <a:ea typeface="나눔스퀘어 Bold" panose="020B0600000101010101" pitchFamily="50" charset="-127"/>
                   </a:rPr>
                   <a:t>Client</a:t>
                 </a:r>
+                <a:endParaRPr lang="ko-KR" altLang="en-US" sz="500" dirty="0">
+                  <a:solidFill>
+                    <a:srgbClr val="4285F4"/>
+                  </a:solidFill>
+                  <a:latin typeface="나눔스퀘어 Bold" panose="020B0600000101010101" pitchFamily="50" charset="-127"/>
+                  <a:ea typeface="나눔스퀘어 Bold" panose="020B0600000101010101" pitchFamily="50" charset="-127"/>
+                </a:endParaRPr>
               </a:p>
             </p:txBody>
           </p:sp>
           <p:sp>
             <p:nvSpPr>
-              <p:cNvPr id="14" name="TextBox 13"/>
+              <p:cNvPr id="27" name="직사각형 26"/>
+              <p:cNvSpPr/>
+              <p:nvPr/>
+            </p:nvSpPr>
+            <p:spPr>
+              <a:xfrm>
+                <a:off x="6090669" y="4709953"/>
+                <a:ext cx="197591" cy="45719"/>
+              </a:xfrm>
+              <a:prstGeom prst="rect">
+                <a:avLst/>
+              </a:prstGeom>
+              <a:solidFill>
+                <a:schemeClr val="bg1"/>
+              </a:solidFill>
+              <a:ln>
+                <a:solidFill>
+                  <a:schemeClr val="bg1"/>
+                </a:solidFill>
+              </a:ln>
+            </p:spPr>
+            <p:style>
+              <a:lnRef idx="2">
+                <a:schemeClr val="accent1">
+                  <a:shade val="50000"/>
+                </a:schemeClr>
+              </a:lnRef>
+              <a:fillRef idx="1">
+                <a:schemeClr val="accent1"/>
+              </a:fillRef>
+              <a:effectRef idx="0">
+                <a:schemeClr val="accent1"/>
+              </a:effectRef>
+              <a:fontRef idx="minor">
+                <a:schemeClr val="lt1"/>
+              </a:fontRef>
+            </p:style>
+            <p:txBody>
+              <a:bodyPr rtlCol="0" anchor="ctr"/>
+              <a:lstStyle/>
+              <a:p>
+                <a:pPr algn="ctr"/>
+                <a:endParaRPr lang="ko-KR" altLang="en-US"/>
+              </a:p>
+            </p:txBody>
+          </p:sp>
+          <p:sp>
+            <p:nvSpPr>
+              <p:cNvPr id="28" name="TextBox 27"/>
               <p:cNvSpPr txBox="1"/>
               <p:nvPr/>
             </p:nvSpPr>
             <p:spPr>
               <a:xfrm>
-                <a:off x="6503947" y="5931617"/>
-                <a:ext cx="2707356" cy="461665"/>
+                <a:off x="5980317" y="4682419"/>
+                <a:ext cx="350045" cy="113569"/>
               </a:xfrm>
               <a:prstGeom prst="rect">
                 <a:avLst/>
@@ -5292,826 +5916,72 @@
               <a:p>
                 <a:pPr algn="ctr"/>
                 <a:r>
-                  <a:rPr lang="en-US" altLang="ko-KR" sz="2400" dirty="0" smtClean="0">
+                  <a:rPr lang="en-US" altLang="ko-KR" sz="500" dirty="0" smtClean="0">
+                    <a:solidFill>
+                      <a:srgbClr val="4285F4"/>
+                    </a:solidFill>
                     <a:latin typeface="나눔스퀘어 Bold" panose="020B0600000101010101" pitchFamily="50" charset="-127"/>
                     <a:ea typeface="나눔스퀘어 Bold" panose="020B0600000101010101" pitchFamily="50" charset="-127"/>
                   </a:rPr>
-                  <a:t>Resource Server</a:t>
+                  <a:t>Client</a:t>
                 </a:r>
-              </a:p>
-            </p:txBody>
-          </p:sp>
-          <p:sp>
-            <p:nvSpPr>
-              <p:cNvPr id="19" name="TextBox 18"/>
-              <p:cNvSpPr txBox="1"/>
-              <p:nvPr/>
-            </p:nvSpPr>
-            <p:spPr>
-              <a:xfrm>
-                <a:off x="8804638" y="773193"/>
-                <a:ext cx="2625362" cy="584775"/>
-              </a:xfrm>
-              <a:prstGeom prst="rect">
-                <a:avLst/>
-              </a:prstGeom>
-              <a:noFill/>
-            </p:spPr>
-            <p:txBody>
-              <a:bodyPr wrap="square" rtlCol="0">
-                <a:spAutoFit/>
-              </a:bodyPr>
-              <a:lstStyle/>
-              <a:p>
-                <a:r>
-                  <a:rPr lang="en-US" altLang="ko-KR" sz="1600" dirty="0" smtClean="0">
-                    <a:latin typeface="나눔스퀘어 Bold" panose="020B0600000101010101" pitchFamily="50" charset="-127"/>
-                    <a:ea typeface="나눔스퀘어 Bold" panose="020B0600000101010101" pitchFamily="50" charset="-127"/>
-                  </a:rPr>
-                  <a:t>Client ID: 1234</a:t>
-                </a:r>
-              </a:p>
-              <a:p>
-                <a:r>
-                  <a:rPr lang="en-US" altLang="ko-KR" sz="1600" dirty="0" smtClean="0">
-                    <a:latin typeface="나눔스퀘어 Bold" panose="020B0600000101010101" pitchFamily="50" charset="-127"/>
-                    <a:ea typeface="나눔스퀘어 Bold" panose="020B0600000101010101" pitchFamily="50" charset="-127"/>
-                  </a:rPr>
-                  <a:t>Client Secret: 0101</a:t>
-                </a:r>
-              </a:p>
-            </p:txBody>
-          </p:sp>
-          <p:sp>
-            <p:nvSpPr>
-              <p:cNvPr id="20" name="TextBox 19"/>
-              <p:cNvSpPr txBox="1"/>
-              <p:nvPr/>
-            </p:nvSpPr>
-            <p:spPr>
-              <a:xfrm>
-                <a:off x="8704806" y="4667562"/>
-                <a:ext cx="3372894" cy="1446550"/>
-              </a:xfrm>
-              <a:prstGeom prst="rect">
-                <a:avLst/>
-              </a:prstGeom>
-              <a:noFill/>
-            </p:spPr>
-            <p:txBody>
-              <a:bodyPr wrap="square" rtlCol="0">
-                <a:spAutoFit/>
-              </a:bodyPr>
-              <a:lstStyle/>
-              <a:p>
-                <a:r>
-                  <a:rPr lang="en-US" altLang="ko-KR" sz="1600" dirty="0" smtClean="0">
-                    <a:latin typeface="나눔스퀘어 Bold" panose="020B0600000101010101" pitchFamily="50" charset="-127"/>
-                    <a:ea typeface="나눔스퀘어 Bold" panose="020B0600000101010101" pitchFamily="50" charset="-127"/>
-                  </a:rPr>
-                  <a:t>Client ID: 1234</a:t>
-                </a:r>
-              </a:p>
-              <a:p>
-                <a:r>
-                  <a:rPr lang="en-US" altLang="ko-KR" sz="1600" dirty="0" smtClean="0">
-                    <a:latin typeface="나눔스퀘어 Bold" panose="020B0600000101010101" pitchFamily="50" charset="-127"/>
-                    <a:ea typeface="나눔스퀘어 Bold" panose="020B0600000101010101" pitchFamily="50" charset="-127"/>
-                  </a:rPr>
-                  <a:t>Client Secret: 0101</a:t>
-                </a:r>
-              </a:p>
-              <a:p>
-                <a:r>
-                  <a:rPr lang="en-US" altLang="ko-KR" sz="1600" dirty="0" smtClean="0">
-                    <a:latin typeface="나눔스퀘어 Bold" panose="020B0600000101010101" pitchFamily="50" charset="-127"/>
-                    <a:ea typeface="나눔스퀘어 Bold" panose="020B0600000101010101" pitchFamily="50" charset="-127"/>
-                  </a:rPr>
-                  <a:t>Redirect URI: </a:t>
-                </a:r>
-                <a:r>
-                  <a:rPr lang="en-US" altLang="ko-KR" sz="1400" dirty="0" smtClean="0">
-                    <a:latin typeface="나눔스퀘어 Bold" panose="020B0600000101010101" pitchFamily="50" charset="-127"/>
-                    <a:ea typeface="나눔스퀘어 Bold" panose="020B0600000101010101" pitchFamily="50" charset="-127"/>
-                  </a:rPr>
-                  <a:t>https://client/callback</a:t>
-                </a:r>
-              </a:p>
-              <a:p>
-                <a:pPr>
-                  <a:lnSpc>
-                    <a:spcPct val="150000"/>
-                  </a:lnSpc>
-                </a:pPr>
-                <a:r>
-                  <a:rPr lang="en-US" altLang="ko-KR" sz="1600" dirty="0" smtClean="0">
-                    <a:latin typeface="나눔스퀘어 Bold" panose="020B0600000101010101" pitchFamily="50" charset="-127"/>
-                    <a:ea typeface="나눔스퀘어 Bold" panose="020B0600000101010101" pitchFamily="50" charset="-127"/>
-                  </a:rPr>
-                  <a:t>User ID: </a:t>
-                </a:r>
-                <a:r>
-                  <a:rPr lang="en-US" altLang="ko-KR" sz="1600" dirty="0" err="1" smtClean="0">
-                    <a:latin typeface="나눔스퀘어 Bold" panose="020B0600000101010101" pitchFamily="50" charset="-127"/>
-                    <a:ea typeface="나눔스퀘어 Bold" panose="020B0600000101010101" pitchFamily="50" charset="-127"/>
-                  </a:rPr>
-                  <a:t>aaa</a:t>
-                </a:r>
-                <a:endParaRPr lang="en-US" altLang="ko-KR" sz="1600" dirty="0">
-                  <a:latin typeface="나눔스퀘어 Bold" panose="020B0600000101010101" pitchFamily="50" charset="-127"/>
-                  <a:ea typeface="나눔스퀘어 Bold" panose="020B0600000101010101" pitchFamily="50" charset="-127"/>
-                </a:endParaRPr>
-              </a:p>
-              <a:p>
-                <a:r>
-                  <a:rPr lang="en-US" altLang="ko-KR" sz="1600" dirty="0" smtClean="0">
-                    <a:latin typeface="나눔스퀘어 Bold" panose="020B0600000101010101" pitchFamily="50" charset="-127"/>
-                    <a:ea typeface="나눔스퀘어 Bold" panose="020B0600000101010101" pitchFamily="50" charset="-127"/>
-                  </a:rPr>
-                  <a:t>- scope: B, C </a:t>
-                </a:r>
-              </a:p>
-            </p:txBody>
-          </p:sp>
-          <p:sp>
-            <p:nvSpPr>
-              <p:cNvPr id="3" name="TextBox 2"/>
-              <p:cNvSpPr txBox="1"/>
-              <p:nvPr/>
-            </p:nvSpPr>
-            <p:spPr>
-              <a:xfrm>
-                <a:off x="3856399" y="1629063"/>
-                <a:ext cx="2134314" cy="1169551"/>
-              </a:xfrm>
-              <a:prstGeom prst="rect">
-                <a:avLst/>
-              </a:prstGeom>
-              <a:noFill/>
-              <a:ln>
-                <a:solidFill>
-                  <a:schemeClr val="bg1">
-                    <a:lumMod val="75000"/>
-                  </a:schemeClr>
-                </a:solidFill>
-              </a:ln>
-            </p:spPr>
-            <p:txBody>
-              <a:bodyPr wrap="square" rtlCol="0">
-                <a:spAutoFit/>
-              </a:bodyPr>
-              <a:lstStyle/>
-              <a:p>
-                <a:r>
-                  <a:rPr lang="en-US" altLang="ko-KR" sz="1400" dirty="0" err="1" smtClean="0">
-                    <a:latin typeface="나눔스퀘어 Bold" panose="020B0600000101010101" pitchFamily="50" charset="-127"/>
-                    <a:ea typeface="나눔스퀘어 Bold" panose="020B0600000101010101" pitchFamily="50" charset="-127"/>
-                  </a:rPr>
-                  <a:t>resource.server</a:t>
-                </a:r>
-                <a:r>
-                  <a:rPr lang="en-US" altLang="ko-KR" sz="1400" dirty="0" smtClean="0">
-                    <a:latin typeface="나눔스퀘어 Bold" panose="020B0600000101010101" pitchFamily="50" charset="-127"/>
-                    <a:ea typeface="나눔스퀘어 Bold" panose="020B0600000101010101" pitchFamily="50" charset="-127"/>
-                  </a:rPr>
-                  <a:t>/</a:t>
-                </a:r>
-              </a:p>
-              <a:p>
-                <a:r>
-                  <a:rPr lang="en-US" altLang="ko-KR" sz="1400" dirty="0" smtClean="0">
-                    <a:latin typeface="나눔스퀘어 Bold" panose="020B0600000101010101" pitchFamily="50" charset="-127"/>
-                    <a:ea typeface="나눔스퀘어 Bold" panose="020B0600000101010101" pitchFamily="50" charset="-127"/>
-                  </a:rPr>
-                  <a:t>?</a:t>
-                </a:r>
-                <a:r>
-                  <a:rPr lang="en-US" altLang="ko-KR" sz="1400" dirty="0" err="1" smtClean="0">
-                    <a:latin typeface="나눔스퀘어 Bold" panose="020B0600000101010101" pitchFamily="50" charset="-127"/>
-                    <a:ea typeface="나눔스퀘어 Bold" panose="020B0600000101010101" pitchFamily="50" charset="-127"/>
-                  </a:rPr>
-                  <a:t>client_id</a:t>
-                </a:r>
-                <a:r>
-                  <a:rPr lang="en-US" altLang="ko-KR" sz="1400" dirty="0" smtClean="0">
-                    <a:latin typeface="나눔스퀘어 Bold" panose="020B0600000101010101" pitchFamily="50" charset="-127"/>
-                    <a:ea typeface="나눔스퀘어 Bold" panose="020B0600000101010101" pitchFamily="50" charset="-127"/>
-                  </a:rPr>
-                  <a:t>=1234</a:t>
-                </a:r>
-                <a:br>
-                  <a:rPr lang="en-US" altLang="ko-KR" sz="1400" dirty="0" smtClean="0">
-                    <a:latin typeface="나눔스퀘어 Bold" panose="020B0600000101010101" pitchFamily="50" charset="-127"/>
-                    <a:ea typeface="나눔스퀘어 Bold" panose="020B0600000101010101" pitchFamily="50" charset="-127"/>
-                  </a:rPr>
-                </a:br>
-                <a:r>
-                  <a:rPr lang="en-US" altLang="ko-KR" sz="1400" dirty="0" smtClean="0">
-                    <a:latin typeface="나눔스퀘어 Bold" panose="020B0600000101010101" pitchFamily="50" charset="-127"/>
-                    <a:ea typeface="나눔스퀘어 Bold" panose="020B0600000101010101" pitchFamily="50" charset="-127"/>
-                  </a:rPr>
-                  <a:t>&amp;scope=B,C</a:t>
-                </a:r>
-              </a:p>
-              <a:p>
-                <a:r>
-                  <a:rPr lang="en-US" altLang="ko-KR" sz="1400" dirty="0" smtClean="0">
-                    <a:latin typeface="나눔스퀘어 Bold" panose="020B0600000101010101" pitchFamily="50" charset="-127"/>
-                    <a:ea typeface="나눔스퀘어 Bold" panose="020B0600000101010101" pitchFamily="50" charset="-127"/>
-                  </a:rPr>
-                  <a:t>&amp;</a:t>
-                </a:r>
-                <a:r>
-                  <a:rPr lang="en-US" altLang="ko-KR" sz="1400" dirty="0" err="1" smtClean="0">
-                    <a:latin typeface="나눔스퀘어 Bold" panose="020B0600000101010101" pitchFamily="50" charset="-127"/>
-                    <a:ea typeface="나눔스퀘어 Bold" panose="020B0600000101010101" pitchFamily="50" charset="-127"/>
-                  </a:rPr>
-                  <a:t>redirect_uri</a:t>
-                </a:r>
-                <a:r>
-                  <a:rPr lang="en-US" altLang="ko-KR" sz="1400" dirty="0" smtClean="0">
-                    <a:latin typeface="나눔스퀘어 Bold" panose="020B0600000101010101" pitchFamily="50" charset="-127"/>
-                    <a:ea typeface="나눔스퀘어 Bold" panose="020B0600000101010101" pitchFamily="50" charset="-127"/>
-                  </a:rPr>
-                  <a:t>=</a:t>
-                </a:r>
-                <a:r>
-                  <a:rPr lang="en-US" altLang="ko-KR" sz="1400" dirty="0" smtClean="0">
-                    <a:latin typeface="나눔스퀘어 Bold" panose="020B0600000101010101" pitchFamily="50" charset="-127"/>
-                    <a:ea typeface="나눔스퀘어 Bold" panose="020B0600000101010101" pitchFamily="50" charset="-127"/>
-                  </a:rPr>
-                  <a:t> https://client/callback </a:t>
-                </a:r>
-                <a:endParaRPr lang="ko-KR" altLang="en-US" sz="1400" dirty="0">
+                <a:endParaRPr lang="ko-KR" altLang="en-US" sz="500" dirty="0">
+                  <a:solidFill>
+                    <a:srgbClr val="4285F4"/>
+                  </a:solidFill>
                   <a:latin typeface="나눔스퀘어 Bold" panose="020B0600000101010101" pitchFamily="50" charset="-127"/>
                   <a:ea typeface="나눔스퀘어 Bold" panose="020B0600000101010101" pitchFamily="50" charset="-127"/>
                 </a:endParaRPr>
               </a:p>
             </p:txBody>
           </p:sp>
-          <p:cxnSp>
-            <p:nvCxnSpPr>
-              <p:cNvPr id="21" name="직선 화살표 연결선 20"/>
-              <p:cNvCxnSpPr/>
-              <p:nvPr/>
-            </p:nvCxnSpPr>
-            <p:spPr>
-              <a:xfrm>
-                <a:off x="3932350" y="3401247"/>
-                <a:ext cx="3180200" cy="1594778"/>
-              </a:xfrm>
-              <a:prstGeom prst="straightConnector1">
-                <a:avLst/>
-              </a:prstGeom>
-              <a:ln w="57150">
-                <a:tailEnd type="triangle"/>
-              </a:ln>
-            </p:spPr>
-            <p:style>
-              <a:lnRef idx="1">
-                <a:schemeClr val="dk1"/>
-              </a:lnRef>
-              <a:fillRef idx="0">
-                <a:schemeClr val="dk1"/>
-              </a:fillRef>
-              <a:effectRef idx="0">
-                <a:schemeClr val="dk1"/>
-              </a:effectRef>
-              <a:fontRef idx="minor">
-                <a:schemeClr val="tx1"/>
-              </a:fontRef>
-            </p:style>
-          </p:cxnSp>
-          <p:grpSp>
-            <p:nvGrpSpPr>
-              <p:cNvPr id="41" name="그룹 40"/>
-              <p:cNvGrpSpPr/>
-              <p:nvPr/>
-            </p:nvGrpSpPr>
-            <p:grpSpPr>
-              <a:xfrm>
-                <a:off x="4148707" y="3222507"/>
-                <a:ext cx="1178719" cy="616826"/>
-                <a:chOff x="3967821" y="6076621"/>
-                <a:chExt cx="1178719" cy="616826"/>
-              </a:xfrm>
-            </p:grpSpPr>
-            <p:pic>
-              <p:nvPicPr>
-                <p:cNvPr id="5" name="그림 4"/>
-                <p:cNvPicPr>
-                  <a:picLocks noChangeAspect="1"/>
-                </p:cNvPicPr>
-                <p:nvPr/>
-              </p:nvPicPr>
-              <p:blipFill rotWithShape="1">
-                <a:blip r:embed="rId5"/>
-                <a:srcRect l="3953" t="19011" r="5219" b="12681"/>
-                <a:stretch/>
-              </p:blipFill>
-              <p:spPr>
-                <a:xfrm>
-                  <a:off x="3967821" y="6425793"/>
-                  <a:ext cx="1178719" cy="267654"/>
-                </a:xfrm>
-                <a:prstGeom prst="rect">
-                  <a:avLst/>
-                </a:prstGeom>
-              </p:spPr>
-            </p:pic>
-            <p:sp>
-              <p:nvSpPr>
-                <p:cNvPr id="29" name="TextBox 28"/>
-                <p:cNvSpPr txBox="1"/>
-                <p:nvPr/>
-              </p:nvSpPr>
-              <p:spPr>
-                <a:xfrm>
-                  <a:off x="4371024" y="6076621"/>
-                  <a:ext cx="355596" cy="369332"/>
-                </a:xfrm>
-                <a:prstGeom prst="rect">
-                  <a:avLst/>
-                </a:prstGeom>
-                <a:noFill/>
-              </p:spPr>
-              <p:txBody>
-                <a:bodyPr wrap="square" rtlCol="0">
-                  <a:spAutoFit/>
-                </a:bodyPr>
-                <a:lstStyle/>
-                <a:p>
-                  <a:pPr marL="342900" indent="-342900">
-                    <a:buFont typeface="+mj-ea"/>
-                    <a:buAutoNum type="circleNumDbPlain"/>
-                  </a:pPr>
-                  <a:r>
-                    <a:rPr lang="en-US" altLang="ko-KR" dirty="0">
-                      <a:latin typeface="나눔스퀘어 Bold" panose="020B0600000101010101" pitchFamily="50" charset="-127"/>
-                      <a:ea typeface="나눔스퀘어 Bold" panose="020B0600000101010101" pitchFamily="50" charset="-127"/>
-                    </a:rPr>
-                    <a:t> </a:t>
-                  </a:r>
-                  <a:endParaRPr lang="ko-KR" altLang="en-US" dirty="0">
-                    <a:latin typeface="나눔스퀘어 Bold" panose="020B0600000101010101" pitchFamily="50" charset="-127"/>
-                    <a:ea typeface="나눔스퀘어 Bold" panose="020B0600000101010101" pitchFamily="50" charset="-127"/>
-                  </a:endParaRPr>
-                </a:p>
-              </p:txBody>
-            </p:sp>
-          </p:grpSp>
-          <p:grpSp>
-            <p:nvGrpSpPr>
-              <p:cNvPr id="43" name="그룹 42"/>
-              <p:cNvGrpSpPr/>
-              <p:nvPr/>
-            </p:nvGrpSpPr>
-            <p:grpSpPr>
-              <a:xfrm>
-                <a:off x="5634257" y="3058629"/>
-                <a:ext cx="1137622" cy="2302055"/>
-                <a:chOff x="5261021" y="814525"/>
-                <a:chExt cx="1137622" cy="2302055"/>
-              </a:xfrm>
-            </p:grpSpPr>
-            <p:pic>
-              <p:nvPicPr>
-                <p:cNvPr id="4" name="그림 3"/>
-                <p:cNvPicPr>
-                  <a:picLocks noChangeAspect="1"/>
-                </p:cNvPicPr>
-                <p:nvPr/>
-              </p:nvPicPr>
-              <p:blipFill>
-                <a:blip r:embed="rId6"/>
-                <a:stretch>
-                  <a:fillRect/>
-                </a:stretch>
-              </p:blipFill>
-              <p:spPr>
-                <a:xfrm>
-                  <a:off x="5261021" y="1126427"/>
-                  <a:ext cx="1137622" cy="1990153"/>
-                </a:xfrm>
-                <a:prstGeom prst="rect">
-                  <a:avLst/>
-                </a:prstGeom>
-                <a:ln>
+        </p:grpSp>
+        <p:sp>
+          <p:nvSpPr>
+            <p:cNvPr id="30" name="TextBox 29"/>
+            <p:cNvSpPr txBox="1"/>
+            <p:nvPr/>
+          </p:nvSpPr>
+          <p:spPr>
+            <a:xfrm>
+              <a:off x="6213246" y="3508540"/>
+              <a:ext cx="355596" cy="369332"/>
+            </a:xfrm>
+            <a:prstGeom prst="rect">
+              <a:avLst/>
+            </a:prstGeom>
+            <a:noFill/>
+          </p:spPr>
+          <p:txBody>
+            <a:bodyPr wrap="square" rtlCol="0">
+              <a:spAutoFit/>
+            </a:bodyPr>
+            <a:lstStyle/>
+            <a:p>
+              <a:pPr marL="342900" indent="-342900">
+                <a:buFont typeface="+mj-ea"/>
+                <a:buAutoNum type="circleNumDbPlain" startAt="2"/>
+              </a:pPr>
+              <a:r>
+                <a:rPr lang="en-US" altLang="ko-KR" dirty="0" smtClean="0">
                   <a:solidFill>
-                    <a:schemeClr val="bg1">
-                      <a:lumMod val="75000"/>
-                    </a:schemeClr>
+                    <a:srgbClr val="4285F4"/>
                   </a:solidFill>
-                </a:ln>
-              </p:spPr>
-            </p:pic>
-            <p:sp>
-              <p:nvSpPr>
-                <p:cNvPr id="23" name="직사각형 22"/>
-                <p:cNvSpPr/>
-                <p:nvPr/>
-              </p:nvSpPr>
-              <p:spPr>
-                <a:xfrm>
-                  <a:off x="5345906" y="1171929"/>
-                  <a:ext cx="247650" cy="74889"/>
-                </a:xfrm>
-                <a:prstGeom prst="rect">
-                  <a:avLst/>
-                </a:prstGeom>
+                  <a:latin typeface="나눔스퀘어 Bold" panose="020B0600000101010101" pitchFamily="50" charset="-127"/>
+                  <a:ea typeface="나눔스퀘어 Bold" panose="020B0600000101010101" pitchFamily="50" charset="-127"/>
+                </a:rPr>
+                <a:t> </a:t>
+              </a:r>
+              <a:endParaRPr lang="ko-KR" altLang="en-US" dirty="0">
                 <a:solidFill>
-                  <a:schemeClr val="bg1"/>
+                  <a:srgbClr val="4285F4"/>
                 </a:solidFill>
-                <a:ln>
-                  <a:noFill/>
-                </a:ln>
-              </p:spPr>
-              <p:style>
-                <a:lnRef idx="2">
-                  <a:schemeClr val="accent1">
-                    <a:shade val="50000"/>
-                  </a:schemeClr>
-                </a:lnRef>
-                <a:fillRef idx="1">
-                  <a:schemeClr val="accent1"/>
-                </a:fillRef>
-                <a:effectRef idx="0">
-                  <a:schemeClr val="accent1"/>
-                </a:effectRef>
-                <a:fontRef idx="minor">
-                  <a:schemeClr val="lt1"/>
-                </a:fontRef>
-              </p:style>
-              <p:txBody>
-                <a:bodyPr rtlCol="0" anchor="ctr"/>
-                <a:lstStyle/>
-                <a:p>
-                  <a:pPr algn="ctr"/>
-                  <a:endParaRPr lang="ko-KR" altLang="en-US"/>
-                </a:p>
-              </p:txBody>
-            </p:sp>
-            <p:sp>
-              <p:nvSpPr>
-                <p:cNvPr id="22" name="TextBox 21"/>
-                <p:cNvSpPr txBox="1"/>
-                <p:nvPr/>
-              </p:nvSpPr>
-              <p:spPr>
-                <a:xfrm>
-                  <a:off x="5315843" y="1126427"/>
-                  <a:ext cx="387304" cy="169277"/>
-                </a:xfrm>
-                <a:prstGeom prst="rect">
-                  <a:avLst/>
-                </a:prstGeom>
-                <a:noFill/>
-              </p:spPr>
-              <p:txBody>
-                <a:bodyPr wrap="square" rtlCol="0">
-                  <a:spAutoFit/>
-                </a:bodyPr>
-                <a:lstStyle/>
-                <a:p>
-                  <a:r>
-                    <a:rPr lang="en-US" altLang="ko-KR" sz="500" dirty="0" smtClean="0">
-                      <a:solidFill>
-                        <a:srgbClr val="4285F4"/>
-                      </a:solidFill>
-                      <a:latin typeface="나눔스퀘어 ExtraBold" panose="020B0600000101010101" pitchFamily="50" charset="-127"/>
-                      <a:ea typeface="나눔스퀘어 ExtraBold" panose="020B0600000101010101" pitchFamily="50" charset="-127"/>
-                    </a:rPr>
-                    <a:t>Client</a:t>
-                  </a:r>
-                  <a:endParaRPr lang="ko-KR" altLang="en-US" sz="500" dirty="0">
-                    <a:solidFill>
-                      <a:srgbClr val="4285F4"/>
-                    </a:solidFill>
-                    <a:latin typeface="나눔스퀘어 ExtraBold" panose="020B0600000101010101" pitchFamily="50" charset="-127"/>
-                    <a:ea typeface="나눔스퀘어 ExtraBold" panose="020B0600000101010101" pitchFamily="50" charset="-127"/>
-                  </a:endParaRPr>
-                </a:p>
-              </p:txBody>
-            </p:sp>
-            <p:sp>
-              <p:nvSpPr>
-                <p:cNvPr id="24" name="TextBox 23"/>
-                <p:cNvSpPr txBox="1"/>
-                <p:nvPr/>
-              </p:nvSpPr>
-              <p:spPr>
-                <a:xfrm>
-                  <a:off x="5528603" y="1302176"/>
-                  <a:ext cx="602457" cy="153888"/>
-                </a:xfrm>
-                <a:prstGeom prst="rect">
-                  <a:avLst/>
-                </a:prstGeom>
-                <a:noFill/>
-              </p:spPr>
-              <p:txBody>
-                <a:bodyPr wrap="square" rtlCol="0">
-                  <a:spAutoFit/>
-                </a:bodyPr>
-                <a:lstStyle/>
-                <a:p>
-                  <a:pPr algn="ctr"/>
-                  <a:r>
-                    <a:rPr lang="en-US" altLang="ko-KR" sz="400" dirty="0">
-                      <a:solidFill>
-                        <a:srgbClr val="4285F4"/>
-                      </a:solidFill>
-                      <a:latin typeface="나눔스퀘어 Bold" panose="020B0600000101010101" pitchFamily="50" charset="-127"/>
-                      <a:ea typeface="나눔스퀘어 Bold" panose="020B0600000101010101" pitchFamily="50" charset="-127"/>
-                    </a:rPr>
-                    <a:t>u</a:t>
-                  </a:r>
-                  <a:r>
-                    <a:rPr lang="en-US" altLang="ko-KR" sz="400" dirty="0" smtClean="0">
-                      <a:solidFill>
-                        <a:srgbClr val="4285F4"/>
-                      </a:solidFill>
-                      <a:latin typeface="나눔스퀘어 Bold" panose="020B0600000101010101" pitchFamily="50" charset="-127"/>
-                      <a:ea typeface="나눔스퀘어 Bold" panose="020B0600000101010101" pitchFamily="50" charset="-127"/>
-                    </a:rPr>
-                    <a:t>ser.email.com</a:t>
-                  </a:r>
-                  <a:endParaRPr lang="ko-KR" altLang="en-US" sz="400" dirty="0">
-                    <a:solidFill>
-                      <a:srgbClr val="4285F4"/>
-                    </a:solidFill>
-                    <a:latin typeface="나눔스퀘어 Bold" panose="020B0600000101010101" pitchFamily="50" charset="-127"/>
-                    <a:ea typeface="나눔스퀘어 Bold" panose="020B0600000101010101" pitchFamily="50" charset="-127"/>
-                  </a:endParaRPr>
-                </a:p>
-              </p:txBody>
-            </p:sp>
-            <p:sp>
-              <p:nvSpPr>
-                <p:cNvPr id="25" name="직사각형 24"/>
-                <p:cNvSpPr/>
-                <p:nvPr/>
-              </p:nvSpPr>
-              <p:spPr>
-                <a:xfrm>
-                  <a:off x="5593556" y="1504950"/>
-                  <a:ext cx="140494" cy="45719"/>
-                </a:xfrm>
-                <a:prstGeom prst="rect">
-                  <a:avLst/>
-                </a:prstGeom>
-                <a:solidFill>
-                  <a:schemeClr val="bg1"/>
-                </a:solidFill>
-                <a:ln>
-                  <a:solidFill>
-                    <a:schemeClr val="bg1"/>
-                  </a:solidFill>
-                </a:ln>
-              </p:spPr>
-              <p:style>
-                <a:lnRef idx="2">
-                  <a:schemeClr val="accent1">
-                    <a:shade val="50000"/>
-                  </a:schemeClr>
-                </a:lnRef>
-                <a:fillRef idx="1">
-                  <a:schemeClr val="accent1"/>
-                </a:fillRef>
-                <a:effectRef idx="0">
-                  <a:schemeClr val="accent1"/>
-                </a:effectRef>
-                <a:fontRef idx="minor">
-                  <a:schemeClr val="lt1"/>
-                </a:fontRef>
-              </p:style>
-              <p:txBody>
-                <a:bodyPr rtlCol="0" anchor="ctr"/>
-                <a:lstStyle/>
-                <a:p>
-                  <a:pPr algn="ctr"/>
-                  <a:endParaRPr lang="ko-KR" altLang="en-US"/>
-                </a:p>
-              </p:txBody>
-            </p:sp>
-            <p:sp>
-              <p:nvSpPr>
-                <p:cNvPr id="26" name="TextBox 25"/>
-                <p:cNvSpPr txBox="1"/>
-                <p:nvPr/>
-              </p:nvSpPr>
-              <p:spPr>
-                <a:xfrm>
-                  <a:off x="5493543" y="1441341"/>
-                  <a:ext cx="350045" cy="153888"/>
-                </a:xfrm>
-                <a:prstGeom prst="rect">
-                  <a:avLst/>
-                </a:prstGeom>
-                <a:noFill/>
-              </p:spPr>
-              <p:txBody>
-                <a:bodyPr wrap="square" rtlCol="0">
-                  <a:spAutoFit/>
-                </a:bodyPr>
-                <a:lstStyle/>
-                <a:p>
-                  <a:pPr algn="ctr"/>
-                  <a:r>
-                    <a:rPr lang="en-US" altLang="ko-KR" sz="400" dirty="0" smtClean="0">
-                      <a:solidFill>
-                        <a:srgbClr val="4285F4"/>
-                      </a:solidFill>
-                      <a:latin typeface="나눔스퀘어 Bold" panose="020B0600000101010101" pitchFamily="50" charset="-127"/>
-                      <a:ea typeface="나눔스퀘어 Bold" panose="020B0600000101010101" pitchFamily="50" charset="-127"/>
-                    </a:rPr>
-                    <a:t>Client</a:t>
-                  </a:r>
-                  <a:endParaRPr lang="ko-KR" altLang="en-US" sz="400" dirty="0">
-                    <a:solidFill>
-                      <a:srgbClr val="4285F4"/>
-                    </a:solidFill>
-                    <a:latin typeface="나눔스퀘어 Bold" panose="020B0600000101010101" pitchFamily="50" charset="-127"/>
-                    <a:ea typeface="나눔스퀘어 Bold" panose="020B0600000101010101" pitchFamily="50" charset="-127"/>
-                  </a:endParaRPr>
-                </a:p>
-              </p:txBody>
-            </p:sp>
-            <p:sp>
-              <p:nvSpPr>
-                <p:cNvPr id="27" name="직사각형 26"/>
-                <p:cNvSpPr/>
-                <p:nvPr/>
-              </p:nvSpPr>
-              <p:spPr>
-                <a:xfrm>
-                  <a:off x="5717433" y="2490787"/>
-                  <a:ext cx="197591" cy="45719"/>
-                </a:xfrm>
-                <a:prstGeom prst="rect">
-                  <a:avLst/>
-                </a:prstGeom>
-                <a:solidFill>
-                  <a:schemeClr val="bg1"/>
-                </a:solidFill>
-                <a:ln>
-                  <a:solidFill>
-                    <a:schemeClr val="bg1"/>
-                  </a:solidFill>
-                </a:ln>
-              </p:spPr>
-              <p:style>
-                <a:lnRef idx="2">
-                  <a:schemeClr val="accent1">
-                    <a:shade val="50000"/>
-                  </a:schemeClr>
-                </a:lnRef>
-                <a:fillRef idx="1">
-                  <a:schemeClr val="accent1"/>
-                </a:fillRef>
-                <a:effectRef idx="0">
-                  <a:schemeClr val="accent1"/>
-                </a:effectRef>
-                <a:fontRef idx="minor">
-                  <a:schemeClr val="lt1"/>
-                </a:fontRef>
-              </p:style>
-              <p:txBody>
-                <a:bodyPr rtlCol="0" anchor="ctr"/>
-                <a:lstStyle/>
-                <a:p>
-                  <a:pPr algn="ctr"/>
-                  <a:endParaRPr lang="ko-KR" altLang="en-US"/>
-                </a:p>
-              </p:txBody>
-            </p:sp>
-            <p:sp>
-              <p:nvSpPr>
-                <p:cNvPr id="28" name="TextBox 27"/>
-                <p:cNvSpPr txBox="1"/>
-                <p:nvPr/>
-              </p:nvSpPr>
-              <p:spPr>
-                <a:xfrm>
-                  <a:off x="5617477" y="2440569"/>
-                  <a:ext cx="350045" cy="153888"/>
-                </a:xfrm>
-                <a:prstGeom prst="rect">
-                  <a:avLst/>
-                </a:prstGeom>
-                <a:noFill/>
-              </p:spPr>
-              <p:txBody>
-                <a:bodyPr wrap="square" rtlCol="0">
-                  <a:spAutoFit/>
-                </a:bodyPr>
-                <a:lstStyle/>
-                <a:p>
-                  <a:pPr algn="ctr"/>
-                  <a:r>
-                    <a:rPr lang="en-US" altLang="ko-KR" sz="400" dirty="0" smtClean="0">
-                      <a:solidFill>
-                        <a:srgbClr val="4285F4"/>
-                      </a:solidFill>
-                      <a:latin typeface="나눔스퀘어 Bold" panose="020B0600000101010101" pitchFamily="50" charset="-127"/>
-                      <a:ea typeface="나눔스퀘어 Bold" panose="020B0600000101010101" pitchFamily="50" charset="-127"/>
-                    </a:rPr>
-                    <a:t>Client</a:t>
-                  </a:r>
-                  <a:endParaRPr lang="ko-KR" altLang="en-US" sz="400" dirty="0">
-                    <a:solidFill>
-                      <a:srgbClr val="4285F4"/>
-                    </a:solidFill>
-                    <a:latin typeface="나눔스퀘어 Bold" panose="020B0600000101010101" pitchFamily="50" charset="-127"/>
-                    <a:ea typeface="나눔스퀘어 Bold" panose="020B0600000101010101" pitchFamily="50" charset="-127"/>
-                  </a:endParaRPr>
-                </a:p>
-              </p:txBody>
-            </p:sp>
-            <p:sp>
-              <p:nvSpPr>
-                <p:cNvPr id="30" name="TextBox 29"/>
-                <p:cNvSpPr txBox="1"/>
-                <p:nvPr/>
-              </p:nvSpPr>
-              <p:spPr>
-                <a:xfrm>
-                  <a:off x="5626040" y="814525"/>
-                  <a:ext cx="355596" cy="369332"/>
-                </a:xfrm>
-                <a:prstGeom prst="rect">
-                  <a:avLst/>
-                </a:prstGeom>
-                <a:noFill/>
-              </p:spPr>
-              <p:txBody>
-                <a:bodyPr wrap="square" rtlCol="0">
-                  <a:spAutoFit/>
-                </a:bodyPr>
-                <a:lstStyle/>
-                <a:p>
-                  <a:pPr marL="342900" indent="-342900">
-                    <a:buFont typeface="+mj-ea"/>
-                    <a:buAutoNum type="circleNumDbPlain" startAt="2"/>
-                  </a:pPr>
-                  <a:r>
-                    <a:rPr lang="en-US" altLang="ko-KR" dirty="0" smtClean="0">
-                      <a:latin typeface="나눔스퀘어 Bold" panose="020B0600000101010101" pitchFamily="50" charset="-127"/>
-                      <a:ea typeface="나눔스퀘어 Bold" panose="020B0600000101010101" pitchFamily="50" charset="-127"/>
-                    </a:rPr>
-                    <a:t> </a:t>
-                  </a:r>
-                  <a:endParaRPr lang="ko-KR" altLang="en-US" dirty="0">
-                    <a:latin typeface="나눔스퀘어 Bold" panose="020B0600000101010101" pitchFamily="50" charset="-127"/>
-                    <a:ea typeface="나눔스퀘어 Bold" panose="020B0600000101010101" pitchFamily="50" charset="-127"/>
-                  </a:endParaRPr>
-                </a:p>
-              </p:txBody>
-            </p:sp>
-          </p:grpSp>
-          <p:sp>
-            <p:nvSpPr>
-              <p:cNvPr id="40" name="TextBox 39"/>
-              <p:cNvSpPr txBox="1"/>
-              <p:nvPr/>
-            </p:nvSpPr>
-            <p:spPr>
-              <a:xfrm rot="16200000">
-                <a:off x="4486319" y="2752081"/>
-                <a:ext cx="381000" cy="707886"/>
-              </a:xfrm>
-              <a:prstGeom prst="rect">
-                <a:avLst/>
-              </a:prstGeom>
-              <a:noFill/>
-            </p:spPr>
-            <p:txBody>
-              <a:bodyPr wrap="square" rtlCol="0">
-                <a:spAutoFit/>
-              </a:bodyPr>
-              <a:lstStyle/>
-              <a:p>
-                <a:r>
-                  <a:rPr lang="en-US" altLang="ko-KR" sz="4000" dirty="0" smtClean="0">
-                    <a:solidFill>
-                      <a:schemeClr val="bg2">
-                        <a:lumMod val="90000"/>
-                      </a:schemeClr>
-                    </a:solidFill>
-                  </a:rPr>
-                  <a:t>=</a:t>
-                </a:r>
-                <a:endParaRPr lang="ko-KR" altLang="en-US" sz="4000" dirty="0">
-                  <a:solidFill>
-                    <a:schemeClr val="bg2">
-                      <a:lumMod val="90000"/>
-                    </a:schemeClr>
-                  </a:solidFill>
-                </a:endParaRPr>
-              </a:p>
-            </p:txBody>
-          </p:sp>
-        </p:grpSp>
+                <a:latin typeface="나눔스퀘어 Bold" panose="020B0600000101010101" pitchFamily="50" charset="-127"/>
+                <a:ea typeface="나눔스퀘어 Bold" panose="020B0600000101010101" pitchFamily="50" charset="-127"/>
+              </a:endParaRPr>
+            </a:p>
+          </p:txBody>
+        </p:sp>
         <p:sp>
           <p:nvSpPr>
             <p:cNvPr id="47" name="TextBox 46"/>
@@ -6140,12 +6010,18 @@
               </a:pPr>
               <a:r>
                 <a:rPr lang="en-US" altLang="ko-KR" dirty="0" smtClean="0">
+                  <a:solidFill>
+                    <a:srgbClr val="4285F4"/>
+                  </a:solidFill>
                   <a:latin typeface="나눔스퀘어 Bold" panose="020B0600000101010101" pitchFamily="50" charset="-127"/>
                   <a:ea typeface="나눔스퀘어 Bold" panose="020B0600000101010101" pitchFamily="50" charset="-127"/>
                 </a:rPr>
                 <a:t> </a:t>
               </a:r>
               <a:endParaRPr lang="ko-KR" altLang="en-US" dirty="0">
+                <a:solidFill>
+                  <a:srgbClr val="4285F4"/>
+                </a:solidFill>
                 <a:latin typeface="나눔스퀘어 Bold" panose="020B0600000101010101" pitchFamily="50" charset="-127"/>
                 <a:ea typeface="나눔스퀘어 Bold" panose="020B0600000101010101" pitchFamily="50" charset="-127"/>
               </a:endParaRPr>
@@ -6198,11 +6074,1057 @@
             </a:p>
           </p:txBody>
         </p:sp>
+        <p:cxnSp>
+          <p:nvCxnSpPr>
+            <p:cNvPr id="31" name="직선 화살표 연결선 30"/>
+            <p:cNvCxnSpPr/>
+            <p:nvPr/>
+          </p:nvCxnSpPr>
+          <p:spPr>
+            <a:xfrm flipH="1">
+              <a:off x="4081519" y="1504950"/>
+              <a:ext cx="2583201" cy="1295400"/>
+            </a:xfrm>
+            <a:prstGeom prst="straightConnector1">
+              <a:avLst/>
+            </a:prstGeom>
+            <a:ln w="57150">
+              <a:tailEnd type="triangle"/>
+            </a:ln>
+          </p:spPr>
+          <p:style>
+            <a:lnRef idx="1">
+              <a:schemeClr val="dk1"/>
+            </a:lnRef>
+            <a:fillRef idx="0">
+              <a:schemeClr val="dk1"/>
+            </a:fillRef>
+            <a:effectRef idx="0">
+              <a:schemeClr val="dk1"/>
+            </a:effectRef>
+            <a:fontRef idx="minor">
+              <a:schemeClr val="tx1"/>
+            </a:fontRef>
+          </p:style>
+        </p:cxnSp>
+        <p:grpSp>
+          <p:nvGrpSpPr>
+            <p:cNvPr id="41" name="그룹 40"/>
+            <p:cNvGrpSpPr/>
+            <p:nvPr/>
+          </p:nvGrpSpPr>
+          <p:grpSpPr>
+            <a:xfrm>
+              <a:off x="4922076" y="1504950"/>
+              <a:ext cx="1178719" cy="616826"/>
+              <a:chOff x="4806223" y="4445239"/>
+              <a:chExt cx="1178719" cy="616826"/>
+            </a:xfrm>
+          </p:grpSpPr>
+          <p:pic>
+            <p:nvPicPr>
+              <p:cNvPr id="5" name="그림 4"/>
+              <p:cNvPicPr>
+                <a:picLocks noChangeAspect="1"/>
+              </p:cNvPicPr>
+              <p:nvPr/>
+            </p:nvPicPr>
+            <p:blipFill rotWithShape="1">
+              <a:blip r:embed="rId6"/>
+              <a:srcRect l="3953" t="19011" r="5219" b="12681"/>
+              <a:stretch/>
+            </p:blipFill>
+            <p:spPr>
+              <a:xfrm>
+                <a:off x="4806223" y="4794411"/>
+                <a:ext cx="1178719" cy="267654"/>
+              </a:xfrm>
+              <a:prstGeom prst="rect">
+                <a:avLst/>
+              </a:prstGeom>
+            </p:spPr>
+          </p:pic>
+          <p:sp>
+            <p:nvSpPr>
+              <p:cNvPr id="29" name="TextBox 28"/>
+              <p:cNvSpPr txBox="1"/>
+              <p:nvPr/>
+            </p:nvSpPr>
+            <p:spPr>
+              <a:xfrm>
+                <a:off x="5209426" y="4445239"/>
+                <a:ext cx="355596" cy="369332"/>
+              </a:xfrm>
+              <a:prstGeom prst="rect">
+                <a:avLst/>
+              </a:prstGeom>
+              <a:noFill/>
+            </p:spPr>
+            <p:txBody>
+              <a:bodyPr wrap="square" rtlCol="0">
+                <a:spAutoFit/>
+              </a:bodyPr>
+              <a:lstStyle/>
+              <a:p>
+                <a:pPr marL="342900" indent="-342900">
+                  <a:buFont typeface="+mj-ea"/>
+                  <a:buAutoNum type="circleNumDbPlain"/>
+                </a:pPr>
+                <a:r>
+                  <a:rPr lang="en-US" altLang="ko-KR" dirty="0">
+                    <a:solidFill>
+                      <a:srgbClr val="4285F4"/>
+                    </a:solidFill>
+                    <a:latin typeface="나눔스퀘어 Bold" panose="020B0600000101010101" pitchFamily="50" charset="-127"/>
+                    <a:ea typeface="나눔스퀘어 Bold" panose="020B0600000101010101" pitchFamily="50" charset="-127"/>
+                  </a:rPr>
+                  <a:t> </a:t>
+                </a:r>
+                <a:endParaRPr lang="ko-KR" altLang="en-US" dirty="0">
+                  <a:solidFill>
+                    <a:srgbClr val="4285F4"/>
+                  </a:solidFill>
+                  <a:latin typeface="나눔스퀘어 Bold" panose="020B0600000101010101" pitchFamily="50" charset="-127"/>
+                  <a:ea typeface="나눔스퀘어 Bold" panose="020B0600000101010101" pitchFamily="50" charset="-127"/>
+                </a:endParaRPr>
+              </a:p>
+            </p:txBody>
+          </p:sp>
+        </p:grpSp>
+        <p:cxnSp>
+          <p:nvCxnSpPr>
+            <p:cNvPr id="8" name="직선 화살표 연결선 7"/>
+            <p:cNvCxnSpPr/>
+            <p:nvPr/>
+          </p:nvCxnSpPr>
+          <p:spPr>
+            <a:xfrm>
+              <a:off x="5062090" y="1653671"/>
+              <a:ext cx="14145" cy="178602"/>
+            </a:xfrm>
+            <a:prstGeom prst="straightConnector1">
+              <a:avLst/>
+            </a:prstGeom>
+            <a:ln w="12700">
+              <a:solidFill>
+                <a:schemeClr val="bg2">
+                  <a:lumMod val="75000"/>
+                </a:schemeClr>
+              </a:solidFill>
+              <a:tailEnd type="triangle"/>
+            </a:ln>
+          </p:spPr>
+          <p:style>
+            <a:lnRef idx="1">
+              <a:schemeClr val="accent1"/>
+            </a:lnRef>
+            <a:fillRef idx="0">
+              <a:schemeClr val="accent1"/>
+            </a:fillRef>
+            <a:effectRef idx="0">
+              <a:schemeClr val="accent1"/>
+            </a:effectRef>
+            <a:fontRef idx="minor">
+              <a:schemeClr val="tx1"/>
+            </a:fontRef>
+          </p:style>
+        </p:cxnSp>
       </p:grpSp>
     </p:spTree>
     <p:extLst>
       <p:ext uri="{BB962C8B-B14F-4D97-AF65-F5344CB8AC3E}">
         <p14:creationId xmlns:p14="http://schemas.microsoft.com/office/powerpoint/2010/main" val="3775586284"/>
+      </p:ext>
+    </p:extLst>
+  </p:cSld>
+  <p:clrMapOvr>
+    <a:masterClrMapping/>
+  </p:clrMapOvr>
+</p:sld>
+</file>
+
+<file path=ppt/slides/slide6.xml><?xml version="1.0" encoding="utf-8"?>
+<p:sld xmlns:a="http://schemas.openxmlformats.org/drawingml/2006/main" xmlns:r="http://schemas.openxmlformats.org/officeDocument/2006/relationships" xmlns:p="http://schemas.openxmlformats.org/presentationml/2006/main">
+  <p:cSld>
+    <p:spTree>
+      <p:nvGrpSpPr>
+        <p:cNvPr id="1" name=""/>
+        <p:cNvGrpSpPr/>
+        <p:nvPr/>
+      </p:nvGrpSpPr>
+      <p:grpSpPr>
+        <a:xfrm>
+          <a:off x="0" y="0"/>
+          <a:ext cx="0" cy="0"/>
+          <a:chOff x="0" y="0"/>
+          <a:chExt cx="0" cy="0"/>
+        </a:xfrm>
+      </p:grpSpPr>
+      <p:grpSp>
+        <p:nvGrpSpPr>
+          <p:cNvPr id="55" name="그룹 54"/>
+          <p:cNvGrpSpPr/>
+          <p:nvPr/>
+        </p:nvGrpSpPr>
+        <p:grpSpPr>
+          <a:xfrm>
+            <a:off x="1011044" y="214814"/>
+            <a:ext cx="11066656" cy="6378497"/>
+            <a:chOff x="1011044" y="214814"/>
+            <a:chExt cx="11066656" cy="6378497"/>
+          </a:xfrm>
+        </p:grpSpPr>
+        <p:sp>
+          <p:nvSpPr>
+            <p:cNvPr id="15" name="직사각형 14"/>
+            <p:cNvSpPr/>
+            <p:nvPr/>
+          </p:nvSpPr>
+          <p:spPr>
+            <a:xfrm>
+              <a:off x="1011044" y="214814"/>
+              <a:ext cx="11066656" cy="6378497"/>
+            </a:xfrm>
+            <a:prstGeom prst="rect">
+              <a:avLst/>
+            </a:prstGeom>
+            <a:solidFill>
+              <a:schemeClr val="bg1"/>
+            </a:solidFill>
+            <a:ln>
+              <a:noFill/>
+            </a:ln>
+          </p:spPr>
+          <p:style>
+            <a:lnRef idx="2">
+              <a:schemeClr val="accent1">
+                <a:shade val="50000"/>
+              </a:schemeClr>
+            </a:lnRef>
+            <a:fillRef idx="1">
+              <a:schemeClr val="accent1"/>
+            </a:fillRef>
+            <a:effectRef idx="0">
+              <a:schemeClr val="accent1"/>
+            </a:effectRef>
+            <a:fontRef idx="minor">
+              <a:schemeClr val="lt1"/>
+            </a:fontRef>
+          </p:style>
+          <p:txBody>
+            <a:bodyPr rtlCol="0" anchor="ctr"/>
+            <a:lstStyle/>
+            <a:p>
+              <a:pPr algn="ctr"/>
+              <a:endParaRPr lang="ko-KR" altLang="en-US"/>
+            </a:p>
+          </p:txBody>
+        </p:sp>
+        <p:pic>
+          <p:nvPicPr>
+            <p:cNvPr id="6" name="그림 5"/>
+            <p:cNvPicPr>
+              <a:picLocks noChangeAspect="1"/>
+            </p:cNvPicPr>
+            <p:nvPr/>
+          </p:nvPicPr>
+          <p:blipFill>
+            <a:blip r:embed="rId2" cstate="print">
+              <a:extLst>
+                <a:ext uri="{28A0092B-C50C-407E-A947-70E740481C1C}">
+                  <a14:useLocalDpi xmlns:a14="http://schemas.microsoft.com/office/drawing/2010/main" val="0"/>
+                </a:ext>
+              </a:extLst>
+            </a:blip>
+            <a:stretch>
+              <a:fillRect/>
+            </a:stretch>
+          </p:blipFill>
+          <p:spPr>
+            <a:xfrm>
+              <a:off x="7091547" y="462594"/>
+              <a:ext cx="1532157" cy="1532157"/>
+            </a:xfrm>
+            <a:prstGeom prst="rect">
+              <a:avLst/>
+            </a:prstGeom>
+          </p:spPr>
+        </p:pic>
+        <p:pic>
+          <p:nvPicPr>
+            <p:cNvPr id="7" name="그림 6"/>
+            <p:cNvPicPr>
+              <a:picLocks noChangeAspect="1"/>
+            </p:cNvPicPr>
+            <p:nvPr/>
+          </p:nvPicPr>
+          <p:blipFill>
+            <a:blip r:embed="rId3" cstate="print">
+              <a:extLst>
+                <a:ext uri="{28A0092B-C50C-407E-A947-70E740481C1C}">
+                  <a14:useLocalDpi xmlns:a14="http://schemas.microsoft.com/office/drawing/2010/main" val="0"/>
+                </a:ext>
+              </a:extLst>
+            </a:blip>
+            <a:stretch>
+              <a:fillRect/>
+            </a:stretch>
+          </p:blipFill>
+          <p:spPr>
+            <a:xfrm>
+              <a:off x="2184391" y="2353158"/>
+              <a:ext cx="1532157" cy="1532157"/>
+            </a:xfrm>
+            <a:prstGeom prst="rect">
+              <a:avLst/>
+            </a:prstGeom>
+          </p:spPr>
+        </p:pic>
+        <p:pic>
+          <p:nvPicPr>
+            <p:cNvPr id="9" name="그림 8"/>
+            <p:cNvPicPr>
+              <a:picLocks noChangeAspect="1"/>
+            </p:cNvPicPr>
+            <p:nvPr/>
+          </p:nvPicPr>
+          <p:blipFill>
+            <a:blip r:embed="rId4" cstate="print">
+              <a:extLst>
+                <a:ext uri="{28A0092B-C50C-407E-A947-70E740481C1C}">
+                  <a14:useLocalDpi xmlns:a14="http://schemas.microsoft.com/office/drawing/2010/main" val="0"/>
+                </a:ext>
+              </a:extLst>
+            </a:blip>
+            <a:stretch>
+              <a:fillRect/>
+            </a:stretch>
+          </p:blipFill>
+          <p:spPr>
+            <a:xfrm>
+              <a:off x="7226807" y="4473468"/>
+              <a:ext cx="1261642" cy="1261642"/>
+            </a:xfrm>
+            <a:prstGeom prst="rect">
+              <a:avLst/>
+            </a:prstGeom>
+          </p:spPr>
+        </p:pic>
+        <p:sp>
+          <p:nvSpPr>
+            <p:cNvPr id="12" name="TextBox 11"/>
+            <p:cNvSpPr txBox="1"/>
+            <p:nvPr/>
+          </p:nvSpPr>
+          <p:spPr>
+            <a:xfrm>
+              <a:off x="1597919" y="4011803"/>
+              <a:ext cx="2705100" cy="830997"/>
+            </a:xfrm>
+            <a:prstGeom prst="rect">
+              <a:avLst/>
+            </a:prstGeom>
+            <a:noFill/>
+          </p:spPr>
+          <p:txBody>
+            <a:bodyPr wrap="square" rtlCol="0">
+              <a:spAutoFit/>
+            </a:bodyPr>
+            <a:lstStyle/>
+            <a:p>
+              <a:pPr algn="ctr"/>
+              <a:r>
+                <a:rPr lang="en-US" altLang="ko-KR" sz="2400" dirty="0" smtClean="0">
+                  <a:latin typeface="나눔스퀘어 Bold" panose="020B0600000101010101" pitchFamily="50" charset="-127"/>
+                  <a:ea typeface="나눔스퀘어 Bold" panose="020B0600000101010101" pitchFamily="50" charset="-127"/>
+                </a:rPr>
+                <a:t>Resource Owner</a:t>
+              </a:r>
+              <a:endParaRPr lang="en-US" altLang="ko-KR" sz="2400" dirty="0" smtClean="0">
+                <a:solidFill>
+                  <a:schemeClr val="bg2">
+                    <a:lumMod val="90000"/>
+                  </a:schemeClr>
+                </a:solidFill>
+                <a:latin typeface="나눔스퀘어 Bold" panose="020B0600000101010101" pitchFamily="50" charset="-127"/>
+                <a:ea typeface="나눔스퀘어 Bold" panose="020B0600000101010101" pitchFamily="50" charset="-127"/>
+              </a:endParaRPr>
+            </a:p>
+            <a:p>
+              <a:pPr algn="ctr"/>
+              <a:endParaRPr lang="en-US" altLang="ko-KR" sz="2400" dirty="0" smtClean="0">
+                <a:solidFill>
+                  <a:schemeClr val="bg2">
+                    <a:lumMod val="90000"/>
+                  </a:schemeClr>
+                </a:solidFill>
+                <a:latin typeface="나눔스퀘어 Bold" panose="020B0600000101010101" pitchFamily="50" charset="-127"/>
+                <a:ea typeface="나눔스퀘어 Bold" panose="020B0600000101010101" pitchFamily="50" charset="-127"/>
+              </a:endParaRPr>
+            </a:p>
+          </p:txBody>
+        </p:sp>
+        <p:sp>
+          <p:nvSpPr>
+            <p:cNvPr id="13" name="TextBox 12"/>
+            <p:cNvSpPr txBox="1"/>
+            <p:nvPr/>
+          </p:nvSpPr>
+          <p:spPr>
+            <a:xfrm>
+              <a:off x="6726576" y="1886658"/>
+              <a:ext cx="2262103" cy="461665"/>
+            </a:xfrm>
+            <a:prstGeom prst="rect">
+              <a:avLst/>
+            </a:prstGeom>
+            <a:noFill/>
+          </p:spPr>
+          <p:txBody>
+            <a:bodyPr wrap="square" rtlCol="0">
+              <a:spAutoFit/>
+            </a:bodyPr>
+            <a:lstStyle/>
+            <a:p>
+              <a:pPr algn="ctr"/>
+              <a:r>
+                <a:rPr lang="en-US" altLang="ko-KR" sz="2400" dirty="0" smtClean="0">
+                  <a:latin typeface="나눔스퀘어 Bold" panose="020B0600000101010101" pitchFamily="50" charset="-127"/>
+                  <a:ea typeface="나눔스퀘어 Bold" panose="020B0600000101010101" pitchFamily="50" charset="-127"/>
+                </a:rPr>
+                <a:t>Client</a:t>
+              </a:r>
+            </a:p>
+          </p:txBody>
+        </p:sp>
+        <p:sp>
+          <p:nvSpPr>
+            <p:cNvPr id="14" name="TextBox 13"/>
+            <p:cNvSpPr txBox="1"/>
+            <p:nvPr/>
+          </p:nvSpPr>
+          <p:spPr>
+            <a:xfrm>
+              <a:off x="6097282" y="5906679"/>
+              <a:ext cx="2707356" cy="461665"/>
+            </a:xfrm>
+            <a:prstGeom prst="rect">
+              <a:avLst/>
+            </a:prstGeom>
+            <a:noFill/>
+          </p:spPr>
+          <p:txBody>
+            <a:bodyPr wrap="square" rtlCol="0">
+              <a:spAutoFit/>
+            </a:bodyPr>
+            <a:lstStyle/>
+            <a:p>
+              <a:pPr algn="ctr"/>
+              <a:r>
+                <a:rPr lang="en-US" altLang="ko-KR" sz="2400" dirty="0" smtClean="0">
+                  <a:latin typeface="나눔스퀘어 Bold" panose="020B0600000101010101" pitchFamily="50" charset="-127"/>
+                  <a:ea typeface="나눔스퀘어 Bold" panose="020B0600000101010101" pitchFamily="50" charset="-127"/>
+                </a:rPr>
+                <a:t>Resource Server</a:t>
+              </a:r>
+            </a:p>
+          </p:txBody>
+        </p:sp>
+        <p:sp>
+          <p:nvSpPr>
+            <p:cNvPr id="19" name="TextBox 18"/>
+            <p:cNvSpPr txBox="1"/>
+            <p:nvPr/>
+          </p:nvSpPr>
+          <p:spPr>
+            <a:xfrm>
+              <a:off x="8804638" y="748255"/>
+              <a:ext cx="2625362" cy="830997"/>
+            </a:xfrm>
+            <a:prstGeom prst="rect">
+              <a:avLst/>
+            </a:prstGeom>
+            <a:noFill/>
+          </p:spPr>
+          <p:txBody>
+            <a:bodyPr wrap="square" rtlCol="0">
+              <a:spAutoFit/>
+            </a:bodyPr>
+            <a:lstStyle/>
+            <a:p>
+              <a:r>
+                <a:rPr lang="en-US" altLang="ko-KR" sz="1600" dirty="0" smtClean="0">
+                  <a:latin typeface="나눔스퀘어 Bold" panose="020B0600000101010101" pitchFamily="50" charset="-127"/>
+                  <a:ea typeface="나눔스퀘어 Bold" panose="020B0600000101010101" pitchFamily="50" charset="-127"/>
+                </a:rPr>
+                <a:t>Client ID: 1234</a:t>
+              </a:r>
+            </a:p>
+            <a:p>
+              <a:r>
+                <a:rPr lang="en-US" altLang="ko-KR" sz="1600" dirty="0" smtClean="0">
+                  <a:latin typeface="나눔스퀘어 Bold" panose="020B0600000101010101" pitchFamily="50" charset="-127"/>
+                  <a:ea typeface="나눔스퀘어 Bold" panose="020B0600000101010101" pitchFamily="50" charset="-127"/>
+                </a:rPr>
+                <a:t>Client Secret: </a:t>
+              </a:r>
+              <a:r>
+                <a:rPr lang="en-US" altLang="ko-KR" sz="1600" dirty="0" smtClean="0">
+                  <a:latin typeface="나눔스퀘어 Bold" panose="020B0600000101010101" pitchFamily="50" charset="-127"/>
+                  <a:ea typeface="나눔스퀘어 Bold" panose="020B0600000101010101" pitchFamily="50" charset="-127"/>
+                </a:rPr>
+                <a:t>0101</a:t>
+              </a:r>
+            </a:p>
+            <a:p>
+              <a:r>
+                <a:rPr lang="en-US" altLang="ko-KR" sz="1600" dirty="0" smtClean="0">
+                  <a:latin typeface="나눔스퀘어 Bold" panose="020B0600000101010101" pitchFamily="50" charset="-127"/>
+                  <a:ea typeface="나눔스퀘어 Bold" panose="020B0600000101010101" pitchFamily="50" charset="-127"/>
+                </a:rPr>
+                <a:t>Authorization code: 88</a:t>
+              </a:r>
+              <a:endParaRPr lang="en-US" altLang="ko-KR" sz="1600" dirty="0" smtClean="0">
+                <a:latin typeface="나눔스퀘어 Bold" panose="020B0600000101010101" pitchFamily="50" charset="-127"/>
+                <a:ea typeface="나눔스퀘어 Bold" panose="020B0600000101010101" pitchFamily="50" charset="-127"/>
+              </a:endParaRPr>
+            </a:p>
+          </p:txBody>
+        </p:sp>
+        <p:sp>
+          <p:nvSpPr>
+            <p:cNvPr id="47" name="TextBox 46"/>
+            <p:cNvSpPr txBox="1"/>
+            <p:nvPr/>
+          </p:nvSpPr>
+          <p:spPr>
+            <a:xfrm>
+              <a:off x="10035657" y="5575382"/>
+              <a:ext cx="355596" cy="369332"/>
+            </a:xfrm>
+            <a:prstGeom prst="rect">
+              <a:avLst/>
+            </a:prstGeom>
+            <a:noFill/>
+          </p:spPr>
+          <p:txBody>
+            <a:bodyPr wrap="square" rtlCol="0">
+              <a:spAutoFit/>
+            </a:bodyPr>
+            <a:lstStyle/>
+            <a:p>
+              <a:pPr marL="342900" indent="-342900">
+                <a:buFont typeface="+mj-ea"/>
+                <a:buAutoNum type="circleNumDbPlain" startAt="3"/>
+              </a:pPr>
+              <a:r>
+                <a:rPr lang="en-US" altLang="ko-KR" dirty="0" smtClean="0">
+                  <a:latin typeface="나눔스퀘어 Bold" panose="020B0600000101010101" pitchFamily="50" charset="-127"/>
+                  <a:ea typeface="나눔스퀘어 Bold" panose="020B0600000101010101" pitchFamily="50" charset="-127"/>
+                </a:rPr>
+                <a:t> </a:t>
+              </a:r>
+              <a:endParaRPr lang="ko-KR" altLang="en-US" dirty="0">
+                <a:latin typeface="나눔스퀘어 Bold" panose="020B0600000101010101" pitchFamily="50" charset="-127"/>
+                <a:ea typeface="나눔스퀘어 Bold" panose="020B0600000101010101" pitchFamily="50" charset="-127"/>
+              </a:endParaRPr>
+            </a:p>
+          </p:txBody>
+        </p:sp>
+        <p:sp>
+          <p:nvSpPr>
+            <p:cNvPr id="48" name="직사각형 47"/>
+            <p:cNvSpPr/>
+            <p:nvPr/>
+          </p:nvSpPr>
+          <p:spPr>
+            <a:xfrm>
+              <a:off x="8752431" y="5476875"/>
+              <a:ext cx="2677569" cy="891469"/>
+            </a:xfrm>
+            <a:prstGeom prst="rect">
+              <a:avLst/>
+            </a:prstGeom>
+            <a:solidFill>
+              <a:schemeClr val="bg1"/>
+            </a:solidFill>
+            <a:ln w="19050">
+              <a:solidFill>
+                <a:srgbClr val="4285F4"/>
+              </a:solidFill>
+            </a:ln>
+          </p:spPr>
+          <p:style>
+            <a:lnRef idx="2">
+              <a:schemeClr val="accent1">
+                <a:shade val="50000"/>
+              </a:schemeClr>
+            </a:lnRef>
+            <a:fillRef idx="1">
+              <a:schemeClr val="accent1"/>
+            </a:fillRef>
+            <a:effectRef idx="0">
+              <a:schemeClr val="accent1"/>
+            </a:effectRef>
+            <a:fontRef idx="minor">
+              <a:schemeClr val="lt1"/>
+            </a:fontRef>
+          </p:style>
+          <p:txBody>
+            <a:bodyPr rtlCol="0" anchor="ctr"/>
+            <a:lstStyle/>
+            <a:p>
+              <a:pPr algn="ctr"/>
+              <a:endParaRPr lang="ko-KR" altLang="en-US"/>
+            </a:p>
+          </p:txBody>
+        </p:sp>
+        <p:sp>
+          <p:nvSpPr>
+            <p:cNvPr id="20" name="TextBox 19"/>
+            <p:cNvSpPr txBox="1"/>
+            <p:nvPr/>
+          </p:nvSpPr>
+          <p:spPr>
+            <a:xfrm>
+              <a:off x="8704806" y="4642624"/>
+              <a:ext cx="3372894" cy="1692771"/>
+            </a:xfrm>
+            <a:prstGeom prst="rect">
+              <a:avLst/>
+            </a:prstGeom>
+            <a:noFill/>
+          </p:spPr>
+          <p:txBody>
+            <a:bodyPr wrap="square" rtlCol="0">
+              <a:spAutoFit/>
+            </a:bodyPr>
+            <a:lstStyle/>
+            <a:p>
+              <a:r>
+                <a:rPr lang="en-US" altLang="ko-KR" sz="1600" dirty="0" smtClean="0">
+                  <a:latin typeface="나눔스퀘어 Bold" panose="020B0600000101010101" pitchFamily="50" charset="-127"/>
+                  <a:ea typeface="나눔스퀘어 Bold" panose="020B0600000101010101" pitchFamily="50" charset="-127"/>
+                </a:rPr>
+                <a:t>Client ID: 1234</a:t>
+              </a:r>
+            </a:p>
+            <a:p>
+              <a:r>
+                <a:rPr lang="en-US" altLang="ko-KR" sz="1600" dirty="0" smtClean="0">
+                  <a:latin typeface="나눔스퀘어 Bold" panose="020B0600000101010101" pitchFamily="50" charset="-127"/>
+                  <a:ea typeface="나눔스퀘어 Bold" panose="020B0600000101010101" pitchFamily="50" charset="-127"/>
+                </a:rPr>
+                <a:t>Client Secret: 0101</a:t>
+              </a:r>
+            </a:p>
+            <a:p>
+              <a:r>
+                <a:rPr lang="en-US" altLang="ko-KR" sz="1600" dirty="0" smtClean="0">
+                  <a:latin typeface="나눔스퀘어 Bold" panose="020B0600000101010101" pitchFamily="50" charset="-127"/>
+                  <a:ea typeface="나눔스퀘어 Bold" panose="020B0600000101010101" pitchFamily="50" charset="-127"/>
+                </a:rPr>
+                <a:t>Redirect URI: </a:t>
+              </a:r>
+              <a:r>
+                <a:rPr lang="en-US" altLang="ko-KR" sz="1400" dirty="0" smtClean="0">
+                  <a:latin typeface="나눔스퀘어 Bold" panose="020B0600000101010101" pitchFamily="50" charset="-127"/>
+                  <a:ea typeface="나눔스퀘어 Bold" panose="020B0600000101010101" pitchFamily="50" charset="-127"/>
+                </a:rPr>
+                <a:t>https://client/callback</a:t>
+              </a:r>
+            </a:p>
+            <a:p>
+              <a:pPr>
+                <a:lnSpc>
+                  <a:spcPct val="150000"/>
+                </a:lnSpc>
+              </a:pPr>
+              <a:r>
+                <a:rPr lang="en-US" altLang="ko-KR" sz="1600" dirty="0" smtClean="0">
+                  <a:latin typeface="나눔스퀘어 Bold" panose="020B0600000101010101" pitchFamily="50" charset="-127"/>
+                  <a:ea typeface="나눔스퀘어 Bold" panose="020B0600000101010101" pitchFamily="50" charset="-127"/>
+                </a:rPr>
+                <a:t>User ID: </a:t>
+              </a:r>
+              <a:r>
+                <a:rPr lang="en-US" altLang="ko-KR" sz="1600" dirty="0" err="1" smtClean="0">
+                  <a:latin typeface="나눔스퀘어 Bold" panose="020B0600000101010101" pitchFamily="50" charset="-127"/>
+                  <a:ea typeface="나눔스퀘어 Bold" panose="020B0600000101010101" pitchFamily="50" charset="-127"/>
+                </a:rPr>
+                <a:t>aaa</a:t>
+              </a:r>
+              <a:endParaRPr lang="en-US" altLang="ko-KR" sz="1600" dirty="0">
+                <a:latin typeface="나눔스퀘어 Bold" panose="020B0600000101010101" pitchFamily="50" charset="-127"/>
+                <a:ea typeface="나눔스퀘어 Bold" panose="020B0600000101010101" pitchFamily="50" charset="-127"/>
+              </a:endParaRPr>
+            </a:p>
+            <a:p>
+              <a:pPr marL="285750" indent="-285750">
+                <a:buFontTx/>
+                <a:buChar char="-"/>
+              </a:pPr>
+              <a:r>
+                <a:rPr lang="en-US" altLang="ko-KR" sz="1600" dirty="0" smtClean="0">
+                  <a:latin typeface="나눔스퀘어 Bold" panose="020B0600000101010101" pitchFamily="50" charset="-127"/>
+                  <a:ea typeface="나눔스퀘어 Bold" panose="020B0600000101010101" pitchFamily="50" charset="-127"/>
+                </a:rPr>
+                <a:t>scope</a:t>
+              </a:r>
+              <a:r>
+                <a:rPr lang="en-US" altLang="ko-KR" sz="1600" dirty="0" smtClean="0">
+                  <a:latin typeface="나눔스퀘어 Bold" panose="020B0600000101010101" pitchFamily="50" charset="-127"/>
+                  <a:ea typeface="나눔스퀘어 Bold" panose="020B0600000101010101" pitchFamily="50" charset="-127"/>
+                </a:rPr>
+                <a:t>: B, </a:t>
+              </a:r>
+              <a:r>
+                <a:rPr lang="en-US" altLang="ko-KR" sz="1600" dirty="0" smtClean="0">
+                  <a:latin typeface="나눔스퀘어 Bold" panose="020B0600000101010101" pitchFamily="50" charset="-127"/>
+                  <a:ea typeface="나눔스퀘어 Bold" panose="020B0600000101010101" pitchFamily="50" charset="-127"/>
+                </a:rPr>
+                <a:t>C</a:t>
+              </a:r>
+            </a:p>
+            <a:p>
+              <a:pPr marL="285750" indent="-285750">
+                <a:buFontTx/>
+                <a:buChar char="-"/>
+              </a:pPr>
+              <a:r>
+                <a:rPr lang="en-US" altLang="ko-KR" sz="1600" dirty="0" smtClean="0">
+                  <a:latin typeface="나눔스퀘어 Bold" panose="020B0600000101010101" pitchFamily="50" charset="-127"/>
+                  <a:ea typeface="나눔스퀘어 Bold" panose="020B0600000101010101" pitchFamily="50" charset="-127"/>
+                </a:rPr>
+                <a:t>Authorization code: 88 </a:t>
+              </a:r>
+              <a:endParaRPr lang="en-US" altLang="ko-KR" sz="1600" dirty="0" smtClean="0">
+                <a:latin typeface="나눔스퀘어 Bold" panose="020B0600000101010101" pitchFamily="50" charset="-127"/>
+                <a:ea typeface="나눔스퀘어 Bold" panose="020B0600000101010101" pitchFamily="50" charset="-127"/>
+              </a:endParaRPr>
+            </a:p>
+          </p:txBody>
+        </p:sp>
+        <p:sp>
+          <p:nvSpPr>
+            <p:cNvPr id="2" name="TextBox 1"/>
+            <p:cNvSpPr txBox="1"/>
+            <p:nvPr/>
+          </p:nvSpPr>
+          <p:spPr>
+            <a:xfrm>
+              <a:off x="4675588" y="2711958"/>
+              <a:ext cx="3924531" cy="646331"/>
+            </a:xfrm>
+            <a:prstGeom prst="rect">
+              <a:avLst/>
+            </a:prstGeom>
+            <a:noFill/>
+          </p:spPr>
+          <p:txBody>
+            <a:bodyPr wrap="square" rtlCol="0">
+              <a:spAutoFit/>
+            </a:bodyPr>
+            <a:lstStyle/>
+            <a:p>
+              <a:r>
+                <a:rPr lang="en-US" altLang="ko-KR" dirty="0" smtClean="0">
+                  <a:latin typeface="나눔스퀘어 Bold" panose="020B0600000101010101" pitchFamily="50" charset="-127"/>
+                  <a:ea typeface="나눔스퀘어 Bold" panose="020B0600000101010101" pitchFamily="50" charset="-127"/>
+                </a:rPr>
+                <a:t>Location: https://client/callback?code=88</a:t>
+              </a:r>
+              <a:endParaRPr lang="ko-KR" altLang="en-US" dirty="0">
+                <a:latin typeface="나눔스퀘어 Bold" panose="020B0600000101010101" pitchFamily="50" charset="-127"/>
+                <a:ea typeface="나눔스퀘어 Bold" panose="020B0600000101010101" pitchFamily="50" charset="-127"/>
+              </a:endParaRPr>
+            </a:p>
+          </p:txBody>
+        </p:sp>
+        <p:cxnSp>
+          <p:nvCxnSpPr>
+            <p:cNvPr id="17" name="직선 연결선 16"/>
+            <p:cNvCxnSpPr/>
+            <p:nvPr/>
+          </p:nvCxnSpPr>
+          <p:spPr>
+            <a:xfrm>
+              <a:off x="7325654" y="3292532"/>
+              <a:ext cx="968692" cy="0"/>
+            </a:xfrm>
+            <a:prstGeom prst="line">
+              <a:avLst/>
+            </a:prstGeom>
+            <a:ln w="28575">
+              <a:solidFill>
+                <a:srgbClr val="4285F4"/>
+              </a:solidFill>
+            </a:ln>
+          </p:spPr>
+          <p:style>
+            <a:lnRef idx="1">
+              <a:schemeClr val="accent1"/>
+            </a:lnRef>
+            <a:fillRef idx="0">
+              <a:schemeClr val="accent1"/>
+            </a:fillRef>
+            <a:effectRef idx="0">
+              <a:schemeClr val="accent1"/>
+            </a:effectRef>
+            <a:fontRef idx="minor">
+              <a:schemeClr val="tx1"/>
+            </a:fontRef>
+          </p:style>
+        </p:cxnSp>
+        <p:cxnSp>
+          <p:nvCxnSpPr>
+            <p:cNvPr id="39" name="직선 연결선 38"/>
+            <p:cNvCxnSpPr/>
+            <p:nvPr/>
+          </p:nvCxnSpPr>
+          <p:spPr>
+            <a:xfrm>
+              <a:off x="3960889" y="2982071"/>
+              <a:ext cx="2949654" cy="1914642"/>
+            </a:xfrm>
+            <a:prstGeom prst="line">
+              <a:avLst/>
+            </a:prstGeom>
+            <a:ln w="57150">
+              <a:solidFill>
+                <a:schemeClr val="tx1"/>
+              </a:solidFill>
+            </a:ln>
+          </p:spPr>
+          <p:style>
+            <a:lnRef idx="1">
+              <a:schemeClr val="accent1"/>
+            </a:lnRef>
+            <a:fillRef idx="0">
+              <a:schemeClr val="accent1"/>
+            </a:fillRef>
+            <a:effectRef idx="0">
+              <a:schemeClr val="accent1"/>
+            </a:effectRef>
+            <a:fontRef idx="minor">
+              <a:schemeClr val="tx1"/>
+            </a:fontRef>
+          </p:style>
+        </p:cxnSp>
+        <p:cxnSp>
+          <p:nvCxnSpPr>
+            <p:cNvPr id="40" name="직선 화살표 연결선 39"/>
+            <p:cNvCxnSpPr/>
+            <p:nvPr/>
+          </p:nvCxnSpPr>
+          <p:spPr>
+            <a:xfrm flipV="1">
+              <a:off x="3990407" y="1316492"/>
+              <a:ext cx="2744684" cy="1675650"/>
+            </a:xfrm>
+            <a:prstGeom prst="straightConnector1">
+              <a:avLst/>
+            </a:prstGeom>
+            <a:ln w="57150">
+              <a:solidFill>
+                <a:schemeClr val="tx1"/>
+              </a:solidFill>
+              <a:tailEnd type="triangle"/>
+            </a:ln>
+          </p:spPr>
+          <p:style>
+            <a:lnRef idx="1">
+              <a:schemeClr val="accent1"/>
+            </a:lnRef>
+            <a:fillRef idx="0">
+              <a:schemeClr val="accent1"/>
+            </a:fillRef>
+            <a:effectRef idx="0">
+              <a:schemeClr val="accent1"/>
+            </a:effectRef>
+            <a:fontRef idx="minor">
+              <a:schemeClr val="tx1"/>
+            </a:fontRef>
+          </p:style>
+        </p:cxnSp>
+        <p:sp>
+          <p:nvSpPr>
+            <p:cNvPr id="50" name="TextBox 49"/>
+            <p:cNvSpPr txBox="1"/>
+            <p:nvPr/>
+          </p:nvSpPr>
+          <p:spPr>
+            <a:xfrm>
+              <a:off x="10965800" y="5722013"/>
+              <a:ext cx="355596" cy="369332"/>
+            </a:xfrm>
+            <a:prstGeom prst="rect">
+              <a:avLst/>
+            </a:prstGeom>
+            <a:noFill/>
+          </p:spPr>
+          <p:txBody>
+            <a:bodyPr wrap="square" rtlCol="0">
+              <a:spAutoFit/>
+            </a:bodyPr>
+            <a:lstStyle/>
+            <a:p>
+              <a:pPr marL="342900" indent="-342900">
+                <a:buFont typeface="+mj-ea"/>
+                <a:buAutoNum type="circleNumDbPlain"/>
+              </a:pPr>
+              <a:r>
+                <a:rPr lang="en-US" altLang="ko-KR" dirty="0">
+                  <a:solidFill>
+                    <a:srgbClr val="4285F4"/>
+                  </a:solidFill>
+                  <a:latin typeface="나눔스퀘어 Bold" panose="020B0600000101010101" pitchFamily="50" charset="-127"/>
+                  <a:ea typeface="나눔스퀘어 Bold" panose="020B0600000101010101" pitchFamily="50" charset="-127"/>
+                </a:rPr>
+                <a:t> </a:t>
+              </a:r>
+              <a:endParaRPr lang="ko-KR" altLang="en-US" dirty="0">
+                <a:solidFill>
+                  <a:srgbClr val="4285F4"/>
+                </a:solidFill>
+                <a:latin typeface="나눔스퀘어 Bold" panose="020B0600000101010101" pitchFamily="50" charset="-127"/>
+                <a:ea typeface="나눔스퀘어 Bold" panose="020B0600000101010101" pitchFamily="50" charset="-127"/>
+              </a:endParaRPr>
+            </a:p>
+          </p:txBody>
+        </p:sp>
+        <p:sp>
+          <p:nvSpPr>
+            <p:cNvPr id="51" name="TextBox 50"/>
+            <p:cNvSpPr txBox="1"/>
+            <p:nvPr/>
+          </p:nvSpPr>
+          <p:spPr>
+            <a:xfrm>
+              <a:off x="8115939" y="2807476"/>
+              <a:ext cx="355596" cy="369332"/>
+            </a:xfrm>
+            <a:prstGeom prst="rect">
+              <a:avLst/>
+            </a:prstGeom>
+            <a:noFill/>
+          </p:spPr>
+          <p:txBody>
+            <a:bodyPr wrap="square" rtlCol="0">
+              <a:spAutoFit/>
+            </a:bodyPr>
+            <a:lstStyle/>
+            <a:p>
+              <a:pPr marL="342900" indent="-342900">
+                <a:buFont typeface="+mj-ea"/>
+                <a:buAutoNum type="circleNumDbPlain" startAt="2"/>
+              </a:pPr>
+              <a:r>
+                <a:rPr lang="en-US" altLang="ko-KR" dirty="0" smtClean="0">
+                  <a:solidFill>
+                    <a:srgbClr val="4285F4"/>
+                  </a:solidFill>
+                  <a:latin typeface="나눔스퀘어 Bold" panose="020B0600000101010101" pitchFamily="50" charset="-127"/>
+                  <a:ea typeface="나눔스퀘어 Bold" panose="020B0600000101010101" pitchFamily="50" charset="-127"/>
+                </a:rPr>
+                <a:t> </a:t>
+              </a:r>
+              <a:endParaRPr lang="ko-KR" altLang="en-US" dirty="0">
+                <a:solidFill>
+                  <a:srgbClr val="4285F4"/>
+                </a:solidFill>
+                <a:latin typeface="나눔스퀘어 Bold" panose="020B0600000101010101" pitchFamily="50" charset="-127"/>
+                <a:ea typeface="나눔스퀘어 Bold" panose="020B0600000101010101" pitchFamily="50" charset="-127"/>
+              </a:endParaRPr>
+            </a:p>
+          </p:txBody>
+        </p:sp>
+        <p:sp>
+          <p:nvSpPr>
+            <p:cNvPr id="52" name="TextBox 51"/>
+            <p:cNvSpPr txBox="1"/>
+            <p:nvPr/>
+          </p:nvSpPr>
+          <p:spPr>
+            <a:xfrm>
+              <a:off x="11064227" y="1209920"/>
+              <a:ext cx="355596" cy="369332"/>
+            </a:xfrm>
+            <a:prstGeom prst="rect">
+              <a:avLst/>
+            </a:prstGeom>
+            <a:noFill/>
+          </p:spPr>
+          <p:txBody>
+            <a:bodyPr wrap="square" rtlCol="0">
+              <a:spAutoFit/>
+            </a:bodyPr>
+            <a:lstStyle/>
+            <a:p>
+              <a:pPr marL="342900" indent="-342900">
+                <a:buFont typeface="+mj-ea"/>
+                <a:buAutoNum type="circleNumDbPlain" startAt="3"/>
+              </a:pPr>
+              <a:r>
+                <a:rPr lang="en-US" altLang="ko-KR" dirty="0" smtClean="0">
+                  <a:solidFill>
+                    <a:srgbClr val="4285F4"/>
+                  </a:solidFill>
+                  <a:latin typeface="나눔스퀘어 Bold" panose="020B0600000101010101" pitchFamily="50" charset="-127"/>
+                  <a:ea typeface="나눔스퀘어 Bold" panose="020B0600000101010101" pitchFamily="50" charset="-127"/>
+                </a:rPr>
+                <a:t> </a:t>
+              </a:r>
+              <a:endParaRPr lang="ko-KR" altLang="en-US" dirty="0">
+                <a:solidFill>
+                  <a:srgbClr val="4285F4"/>
+                </a:solidFill>
+                <a:latin typeface="나눔스퀘어 Bold" panose="020B0600000101010101" pitchFamily="50" charset="-127"/>
+                <a:ea typeface="나눔스퀘어 Bold" panose="020B0600000101010101" pitchFamily="50" charset="-127"/>
+              </a:endParaRPr>
+            </a:p>
+          </p:txBody>
+        </p:sp>
+        <p:cxnSp>
+          <p:nvCxnSpPr>
+            <p:cNvPr id="53" name="직선 연결선 52"/>
+            <p:cNvCxnSpPr/>
+            <p:nvPr/>
+          </p:nvCxnSpPr>
+          <p:spPr>
+            <a:xfrm>
+              <a:off x="8887754" y="1538034"/>
+              <a:ext cx="2255844" cy="0"/>
+            </a:xfrm>
+            <a:prstGeom prst="line">
+              <a:avLst/>
+            </a:prstGeom>
+            <a:ln w="28575">
+              <a:solidFill>
+                <a:srgbClr val="4285F4"/>
+              </a:solidFill>
+            </a:ln>
+          </p:spPr>
+          <p:style>
+            <a:lnRef idx="1">
+              <a:schemeClr val="accent1"/>
+            </a:lnRef>
+            <a:fillRef idx="0">
+              <a:schemeClr val="accent1"/>
+            </a:fillRef>
+            <a:effectRef idx="0">
+              <a:schemeClr val="accent1"/>
+            </a:effectRef>
+            <a:fontRef idx="minor">
+              <a:schemeClr val="tx1"/>
+            </a:fontRef>
+          </p:style>
+        </p:cxnSp>
+      </p:grpSp>
+    </p:spTree>
+    <p:extLst>
+      <p:ext uri="{BB962C8B-B14F-4D97-AF65-F5344CB8AC3E}">
+        <p14:creationId xmlns:p14="http://schemas.microsoft.com/office/powerpoint/2010/main" val="1202140870"/>
       </p:ext>
     </p:extLst>
   </p:cSld>

</xml_diff>